<commit_message>
made the cosmos icon opaque to let hackground shine through harmonically.
</commit_message>
<xml_diff>
--- a/docs/SchemaDocumentation/nmrML_Poster_124_Schober.pptx
+++ b/docs/SchemaDocumentation/nmrML_Poster_124_Schober.pptx
@@ -485,7 +485,7 @@
             <a:fld id="{220332FB-83C8-E24C-BAB1-A588F05ACF5F}" type="datetimeFigureOut">
               <a:rPr lang="en-US" smtClean="0"/>
               <a:pPr/>
-              <a:t>5/15/2014</a:t>
+              <a:t>6/2/2014</a:t>
             </a:fld>
             <a:endParaRPr lang="en-US"/>
           </a:p>
@@ -657,7 +657,7 @@
             <a:fld id="{220332FB-83C8-E24C-BAB1-A588F05ACF5F}" type="datetimeFigureOut">
               <a:rPr lang="en-US" smtClean="0"/>
               <a:pPr/>
-              <a:t>5/15/2014</a:t>
+              <a:t>6/2/2014</a:t>
             </a:fld>
             <a:endParaRPr lang="en-US"/>
           </a:p>
@@ -839,7 +839,7 @@
             <a:fld id="{220332FB-83C8-E24C-BAB1-A588F05ACF5F}" type="datetimeFigureOut">
               <a:rPr lang="en-US" smtClean="0"/>
               <a:pPr/>
-              <a:t>5/15/2014</a:t>
+              <a:t>6/2/2014</a:t>
             </a:fld>
             <a:endParaRPr lang="en-US"/>
           </a:p>
@@ -1011,7 +1011,7 @@
             <a:fld id="{220332FB-83C8-E24C-BAB1-A588F05ACF5F}" type="datetimeFigureOut">
               <a:rPr lang="en-US" smtClean="0"/>
               <a:pPr/>
-              <a:t>5/15/2014</a:t>
+              <a:t>6/2/2014</a:t>
             </a:fld>
             <a:endParaRPr lang="en-US"/>
           </a:p>
@@ -1259,7 +1259,7 @@
             <a:fld id="{220332FB-83C8-E24C-BAB1-A588F05ACF5F}" type="datetimeFigureOut">
               <a:rPr lang="en-US" smtClean="0"/>
               <a:pPr/>
-              <a:t>5/15/2014</a:t>
+              <a:t>6/2/2014</a:t>
             </a:fld>
             <a:endParaRPr lang="en-US"/>
           </a:p>
@@ -1549,7 +1549,7 @@
             <a:fld id="{220332FB-83C8-E24C-BAB1-A588F05ACF5F}" type="datetimeFigureOut">
               <a:rPr lang="en-US" smtClean="0"/>
               <a:pPr/>
-              <a:t>5/15/2014</a:t>
+              <a:t>6/2/2014</a:t>
             </a:fld>
             <a:endParaRPr lang="en-US"/>
           </a:p>
@@ -1978,7 +1978,7 @@
             <a:fld id="{220332FB-83C8-E24C-BAB1-A588F05ACF5F}" type="datetimeFigureOut">
               <a:rPr lang="en-US" smtClean="0"/>
               <a:pPr/>
-              <a:t>5/15/2014</a:t>
+              <a:t>6/2/2014</a:t>
             </a:fld>
             <a:endParaRPr lang="en-US"/>
           </a:p>
@@ -2098,7 +2098,7 @@
             <a:fld id="{220332FB-83C8-E24C-BAB1-A588F05ACF5F}" type="datetimeFigureOut">
               <a:rPr lang="en-US" smtClean="0"/>
               <a:pPr/>
-              <a:t>5/15/2014</a:t>
+              <a:t>6/2/2014</a:t>
             </a:fld>
             <a:endParaRPr lang="en-US"/>
           </a:p>
@@ -2195,7 +2195,7 @@
             <a:fld id="{220332FB-83C8-E24C-BAB1-A588F05ACF5F}" type="datetimeFigureOut">
               <a:rPr lang="en-US" smtClean="0"/>
               <a:pPr/>
-              <a:t>5/15/2014</a:t>
+              <a:t>6/2/2014</a:t>
             </a:fld>
             <a:endParaRPr lang="en-US"/>
           </a:p>
@@ -2474,7 +2474,7 @@
             <a:fld id="{220332FB-83C8-E24C-BAB1-A588F05ACF5F}" type="datetimeFigureOut">
               <a:rPr lang="en-US" smtClean="0"/>
               <a:pPr/>
-              <a:t>5/15/2014</a:t>
+              <a:t>6/2/2014</a:t>
             </a:fld>
             <a:endParaRPr lang="en-US"/>
           </a:p>
@@ -2729,7 +2729,7 @@
             <a:fld id="{220332FB-83C8-E24C-BAB1-A588F05ACF5F}" type="datetimeFigureOut">
               <a:rPr lang="en-US" smtClean="0"/>
               <a:pPr/>
-              <a:t>5/15/2014</a:t>
+              <a:t>6/2/2014</a:t>
             </a:fld>
             <a:endParaRPr lang="en-US"/>
           </a:p>
@@ -2944,7 +2944,7 @@
             <a:fld id="{220332FB-83C8-E24C-BAB1-A588F05ACF5F}" type="datetimeFigureOut">
               <a:rPr lang="en-US" smtClean="0"/>
               <a:pPr/>
-              <a:t>5/15/2014</a:t>
+              <a:t>6/2/2014</a:t>
             </a:fld>
             <a:endParaRPr lang="en-US"/>
           </a:p>
@@ -4888,7 +4888,7 @@
         <p:spPr>
           <a:xfrm>
             <a:off x="754043" y="494876"/>
-            <a:ext cx="2417300" cy="2953862"/>
+            <a:ext cx="2768196" cy="3382646"/>
           </a:xfrm>
           <a:prstGeom prst="rect">
             <a:avLst/>
@@ -7826,7 +7826,7 @@
           <a:graphicData uri="http://schemas.openxmlformats.org/presentationml/2006/ole">
             <mc:AlternateContent xmlns:mc="http://schemas.openxmlformats.org/markup-compatibility/2006">
               <mc:Choice xmlns:v="urn:schemas-microsoft-com:vml" Requires="v">
-                <p:oleObj spid="_x0000_s3121" r:id="rId20" imgW="155999880" imgH="75692160" progId="">
+                <p:oleObj spid="_x0000_s3125" r:id="rId20" imgW="155999880" imgH="75692160" progId="">
                   <p:embed/>
                 </p:oleObj>
               </mc:Choice>
@@ -8104,7 +8104,17 @@
                 <a:latin typeface="Verdana"/>
                 <a:cs typeface="Verdana"/>
               </a:rPr>
-              <a:t> </a:t>
+              <a:t> which checks a data file is syntactically well formatted, sufficiently detailed with respect to data content and annotation and that aspects of </a:t>
+            </a:r>
+            <a:r>
+              <a:rPr lang="en-US" sz="2800" b="1" dirty="0" smtClean="0">
+                <a:solidFill>
+                  <a:srgbClr val="0070C0"/>
+                </a:solidFill>
+                <a:latin typeface="Verdana"/>
+                <a:cs typeface="Verdana"/>
+              </a:rPr>
+              <a:t>minimal information requirements</a:t>
             </a:r>
             <a:r>
               <a:rPr lang="en-US" sz="2800" dirty="0" smtClean="0">
@@ -8114,67 +8124,7 @@
                 <a:latin typeface="Verdana"/>
                 <a:cs typeface="Verdana"/>
               </a:rPr>
-              <a:t>which checks a data file is syntactically well formatted, </a:t>
-            </a:r>
-            <a:r>
-              <a:rPr lang="en-US" sz="2800" dirty="0" smtClean="0">
-                <a:solidFill>
-                  <a:srgbClr val="121421"/>
-                </a:solidFill>
-                <a:latin typeface="Verdana"/>
-                <a:cs typeface="Verdana"/>
-              </a:rPr>
-              <a:t>sufficiently detailed with respect to data content and annotation </a:t>
-            </a:r>
-            <a:r>
-              <a:rPr lang="en-US" sz="2800" dirty="0" smtClean="0">
-                <a:solidFill>
-                  <a:srgbClr val="121421"/>
-                </a:solidFill>
-                <a:latin typeface="Verdana"/>
-                <a:cs typeface="Verdana"/>
-              </a:rPr>
-              <a:t>and that aspects of </a:t>
-            </a:r>
-            <a:r>
-              <a:rPr lang="en-US" sz="2800" b="1" dirty="0" smtClean="0">
-                <a:solidFill>
-                  <a:srgbClr val="0070C0"/>
-                </a:solidFill>
-                <a:latin typeface="Verdana"/>
-                <a:cs typeface="Verdana"/>
-              </a:rPr>
-              <a:t>minimal information </a:t>
-            </a:r>
-            <a:r>
-              <a:rPr lang="en-US" sz="2800" b="1" dirty="0" smtClean="0">
-                <a:solidFill>
-                  <a:srgbClr val="0070C0"/>
-                </a:solidFill>
-                <a:latin typeface="Verdana"/>
-                <a:cs typeface="Verdana"/>
-              </a:rPr>
-              <a:t>requirements</a:t>
-            </a:r>
-            <a:r>
-              <a:rPr lang="en-US" sz="2800" dirty="0" smtClean="0">
-                <a:solidFill>
-                  <a:srgbClr val="121421"/>
-                </a:solidFill>
-                <a:latin typeface="Verdana"/>
-                <a:cs typeface="Verdana"/>
-              </a:rPr>
-              <a:t>, e.g. from </a:t>
-            </a:r>
-            <a:r>
-              <a:rPr lang="en-US" sz="2800" dirty="0" smtClean="0">
-                <a:solidFill>
-                  <a:srgbClr val="121421"/>
-                </a:solidFill>
-                <a:latin typeface="Verdana"/>
-                <a:cs typeface="Verdana"/>
-              </a:rPr>
-              <a:t>the Core Information for Metabolomics Reporting (CIMR) are met.</a:t>
+              <a:t>, e.g. from the Core Information for Metabolomics Reporting (CIMR) are met.</a:t>
             </a:r>
             <a:endParaRPr lang="ro-RO" sz="2800" dirty="0">
               <a:solidFill>
@@ -8901,50 +8851,6 @@
           <a:xfrm rot="1237141">
             <a:off x="7266297" y="32245313"/>
             <a:ext cx="2512940" cy="296192"/>
-          </a:xfrm>
-          <a:prstGeom prst="rightArrow">
-            <a:avLst/>
-          </a:prstGeom>
-          <a:solidFill>
-            <a:schemeClr val="tx2">
-              <a:lumMod val="20000"/>
-              <a:lumOff val="80000"/>
-            </a:schemeClr>
-          </a:solidFill>
-        </p:spPr>
-        <p:style>
-          <a:lnRef idx="1">
-            <a:schemeClr val="accent5"/>
-          </a:lnRef>
-          <a:fillRef idx="3">
-            <a:schemeClr val="accent5"/>
-          </a:fillRef>
-          <a:effectRef idx="2">
-            <a:schemeClr val="accent5"/>
-          </a:effectRef>
-          <a:fontRef idx="minor">
-            <a:schemeClr val="lt1"/>
-          </a:fontRef>
-        </p:style>
-        <p:txBody>
-          <a:bodyPr rtlCol="0" anchor="ctr"/>
-          <a:lstStyle/>
-          <a:p>
-            <a:pPr algn="ctr"/>
-            <a:endParaRPr lang="en-US"/>
-          </a:p>
-        </p:txBody>
-      </p:sp>
-      <p:sp>
-        <p:nvSpPr>
-          <p:cNvPr id="56" name="Pfeil nach rechts 55"/>
-          <p:cNvSpPr/>
-          <p:nvPr/>
-        </p:nvSpPr>
-        <p:spPr>
-          <a:xfrm rot="1779196">
-            <a:off x="15711416" y="34549054"/>
-            <a:ext cx="1892419" cy="299448"/>
           </a:xfrm>
           <a:prstGeom prst="rightArrow">
             <a:avLst/>
@@ -9237,63 +9143,36 @@
           </a:prstGeom>
         </p:spPr>
       </p:pic>
-      <p:graphicFrame>
-        <p:nvGraphicFramePr>
-          <p:cNvPr id="40" name="Objekt 39"/>
-          <p:cNvGraphicFramePr>
-            <a:graphicFrameLocks noChangeAspect="1"/>
-          </p:cNvGraphicFramePr>
-          <p:nvPr>
-            <p:extLst>
-              <p:ext uri="{D42A27DB-BD31-4B8C-83A1-F6EECF244321}">
-                <p14:modId xmlns:p14="http://schemas.microsoft.com/office/powerpoint/2010/main" val="4285269338"/>
-              </p:ext>
-            </p:extLst>
-          </p:nvPr>
-        </p:nvGraphicFramePr>
-        <p:xfrm>
-          <a:off x="25103624" y="473987"/>
-          <a:ext cx="4622800" cy="1231900"/>
-        </p:xfrm>
-        <a:graphic>
-          <a:graphicData uri="http://schemas.openxmlformats.org/presentationml/2006/ole">
-            <mc:AlternateContent xmlns:mc="http://schemas.openxmlformats.org/markup-compatibility/2006">
-              <mc:Choice xmlns:v="urn:schemas-microsoft-com:vml" Requires="v">
-                <p:oleObj spid="_x0000_s3122" r:id="rId31" imgW="4622040" imgH="1231560" progId="">
-                  <p:embed/>
-                </p:oleObj>
-              </mc:Choice>
-              <mc:Fallback>
-                <p:oleObj r:id="rId31" imgW="4622040" imgH="1231560" progId="">
-                  <p:embed/>
-                  <p:pic>
-                    <p:nvPicPr>
-                      <p:cNvPr id="0" name=""/>
-                      <p:cNvPicPr/>
-                      <p:nvPr/>
-                    </p:nvPicPr>
-                    <p:blipFill>
-                      <a:blip r:embed="rId32"/>
-                      <a:stretch>
-                        <a:fillRect/>
-                      </a:stretch>
-                    </p:blipFill>
-                    <p:spPr>
-                      <a:xfrm>
-                        <a:off x="25103624" y="473987"/>
-                        <a:ext cx="4622800" cy="1231900"/>
-                      </a:xfrm>
-                      <a:prstGeom prst="rect">
-                        <a:avLst/>
-                      </a:prstGeom>
-                    </p:spPr>
-                  </p:pic>
-                </p:oleObj>
-              </mc:Fallback>
-            </mc:AlternateContent>
-          </a:graphicData>
-        </a:graphic>
-      </p:graphicFrame>
+      <p:pic>
+        <p:nvPicPr>
+          <p:cNvPr id="8" name="Grafik 7"/>
+          <p:cNvPicPr>
+            <a:picLocks noChangeAspect="1"/>
+          </p:cNvPicPr>
+          <p:nvPr/>
+        </p:nvPicPr>
+        <p:blipFill>
+          <a:blip r:embed="rId31">
+            <a:extLst>
+              <a:ext uri="{28A0092B-C50C-407E-A947-70E740481C1C}">
+                <a14:useLocalDpi xmlns:a14="http://schemas.microsoft.com/office/drawing/2010/main" val="0"/>
+              </a:ext>
+            </a:extLst>
+          </a:blip>
+          <a:stretch>
+            <a:fillRect/>
+          </a:stretch>
+        </p:blipFill>
+        <p:spPr>
+          <a:xfrm>
+            <a:off x="25162827" y="478750"/>
+            <a:ext cx="4619625" cy="1228725"/>
+          </a:xfrm>
+          <a:prstGeom prst="rect">
+            <a:avLst/>
+          </a:prstGeom>
+        </p:spPr>
+      </p:pic>
     </p:spTree>
     <p:extLst>
       <p:ext uri="{BB962C8B-B14F-4D97-AF65-F5344CB8AC3E}">

</xml_diff>

<commit_message>
some last refinements. Please Check if all is OK now.
</commit_message>
<xml_diff>
--- a/docs/SchemaDocumentation/nmrML_Poster_124_Schober.pptx
+++ b/docs/SchemaDocumentation/nmrML_Poster_124_Schober.pptx
@@ -223,20 +223,6 @@
 
 <file path=ppt/comments/comment1.xml><?xml version="1.0" encoding="utf-8"?>
 <p:cmLst xmlns:a="http://schemas.openxmlformats.org/drawingml/2006/main" xmlns:r="http://schemas.openxmlformats.org/officeDocument/2006/relationships" xmlns:p="http://schemas.openxmlformats.org/presentationml/2006/main">
-  <p:cm authorId="1" dt="2014-05-20T13:45:41.009" idx="6">
-    <p:pos x="7302" y="9365"/>
-    <p:text>take color schemed oxygen version of text</p:text>
-    <p:extLst>
-      <p:ext uri="{C676402C-5697-4E1C-873F-D02D1690AC5C}">
-        <p15:threadingInfo xmlns:p15="http://schemas.microsoft.com/office/powerpoint/2012/main" timeZoneBias="-120"/>
-      </p:ext>
-    </p:extLst>
-  </p:cm>
-</p:cmLst>
-</file>
-
-<file path=ppt/comments/comment2.xml><?xml version="1.0" encoding="utf-8"?>
-<p:cmLst xmlns:a="http://schemas.openxmlformats.org/drawingml/2006/main" xmlns:r="http://schemas.openxmlformats.org/officeDocument/2006/relationships" xmlns:p="http://schemas.openxmlformats.org/presentationml/2006/main">
   <p:cm authorId="1" dt="2014-05-15T10:32:49.624" idx="1">
     <p:pos x="10" y="10"/>
     <p:text>Poster size is A0 wide
@@ -485,7 +471,7 @@
             <a:fld id="{220332FB-83C8-E24C-BAB1-A588F05ACF5F}" type="datetimeFigureOut">
               <a:rPr lang="en-US" smtClean="0"/>
               <a:pPr/>
-              <a:t>6/2/2014</a:t>
+              <a:t>6/4/2014</a:t>
             </a:fld>
             <a:endParaRPr lang="en-US"/>
           </a:p>
@@ -657,7 +643,7 @@
             <a:fld id="{220332FB-83C8-E24C-BAB1-A588F05ACF5F}" type="datetimeFigureOut">
               <a:rPr lang="en-US" smtClean="0"/>
               <a:pPr/>
-              <a:t>6/2/2014</a:t>
+              <a:t>6/4/2014</a:t>
             </a:fld>
             <a:endParaRPr lang="en-US"/>
           </a:p>
@@ -839,7 +825,7 @@
             <a:fld id="{220332FB-83C8-E24C-BAB1-A588F05ACF5F}" type="datetimeFigureOut">
               <a:rPr lang="en-US" smtClean="0"/>
               <a:pPr/>
-              <a:t>6/2/2014</a:t>
+              <a:t>6/4/2014</a:t>
             </a:fld>
             <a:endParaRPr lang="en-US"/>
           </a:p>
@@ -1011,7 +997,7 @@
             <a:fld id="{220332FB-83C8-E24C-BAB1-A588F05ACF5F}" type="datetimeFigureOut">
               <a:rPr lang="en-US" smtClean="0"/>
               <a:pPr/>
-              <a:t>6/2/2014</a:t>
+              <a:t>6/4/2014</a:t>
             </a:fld>
             <a:endParaRPr lang="en-US"/>
           </a:p>
@@ -1259,7 +1245,7 @@
             <a:fld id="{220332FB-83C8-E24C-BAB1-A588F05ACF5F}" type="datetimeFigureOut">
               <a:rPr lang="en-US" smtClean="0"/>
               <a:pPr/>
-              <a:t>6/2/2014</a:t>
+              <a:t>6/4/2014</a:t>
             </a:fld>
             <a:endParaRPr lang="en-US"/>
           </a:p>
@@ -1549,7 +1535,7 @@
             <a:fld id="{220332FB-83C8-E24C-BAB1-A588F05ACF5F}" type="datetimeFigureOut">
               <a:rPr lang="en-US" smtClean="0"/>
               <a:pPr/>
-              <a:t>6/2/2014</a:t>
+              <a:t>6/4/2014</a:t>
             </a:fld>
             <a:endParaRPr lang="en-US"/>
           </a:p>
@@ -1978,7 +1964,7 @@
             <a:fld id="{220332FB-83C8-E24C-BAB1-A588F05ACF5F}" type="datetimeFigureOut">
               <a:rPr lang="en-US" smtClean="0"/>
               <a:pPr/>
-              <a:t>6/2/2014</a:t>
+              <a:t>6/4/2014</a:t>
             </a:fld>
             <a:endParaRPr lang="en-US"/>
           </a:p>
@@ -2098,7 +2084,7 @@
             <a:fld id="{220332FB-83C8-E24C-BAB1-A588F05ACF5F}" type="datetimeFigureOut">
               <a:rPr lang="en-US" smtClean="0"/>
               <a:pPr/>
-              <a:t>6/2/2014</a:t>
+              <a:t>6/4/2014</a:t>
             </a:fld>
             <a:endParaRPr lang="en-US"/>
           </a:p>
@@ -2195,7 +2181,7 @@
             <a:fld id="{220332FB-83C8-E24C-BAB1-A588F05ACF5F}" type="datetimeFigureOut">
               <a:rPr lang="en-US" smtClean="0"/>
               <a:pPr/>
-              <a:t>6/2/2014</a:t>
+              <a:t>6/4/2014</a:t>
             </a:fld>
             <a:endParaRPr lang="en-US"/>
           </a:p>
@@ -2474,7 +2460,7 @@
             <a:fld id="{220332FB-83C8-E24C-BAB1-A588F05ACF5F}" type="datetimeFigureOut">
               <a:rPr lang="en-US" smtClean="0"/>
               <a:pPr/>
-              <a:t>6/2/2014</a:t>
+              <a:t>6/4/2014</a:t>
             </a:fld>
             <a:endParaRPr lang="en-US"/>
           </a:p>
@@ -2729,7 +2715,7 @@
             <a:fld id="{220332FB-83C8-E24C-BAB1-A588F05ACF5F}" type="datetimeFigureOut">
               <a:rPr lang="en-US" smtClean="0"/>
               <a:pPr/>
-              <a:t>6/2/2014</a:t>
+              <a:t>6/4/2014</a:t>
             </a:fld>
             <a:endParaRPr lang="en-US"/>
           </a:p>
@@ -2944,7 +2930,7 @@
             <a:fld id="{220332FB-83C8-E24C-BAB1-A588F05ACF5F}" type="datetimeFigureOut">
               <a:rPr lang="en-US" smtClean="0"/>
               <a:pPr/>
-              <a:t>6/2/2014</a:t>
+              <a:t>6/4/2014</a:t>
             </a:fld>
             <a:endParaRPr lang="en-US"/>
           </a:p>
@@ -3340,7 +3326,7 @@
         </p:nvSpPr>
         <p:spPr>
           <a:xfrm>
-            <a:off x="770594" y="29119711"/>
+            <a:off x="797327" y="29621103"/>
             <a:ext cx="28856833" cy="5946497"/>
           </a:xfrm>
           <a:prstGeom prst="rect">
@@ -3381,8 +3367,8 @@
         </p:nvSpPr>
         <p:spPr>
           <a:xfrm>
-            <a:off x="20184052" y="22159089"/>
-            <a:ext cx="9245128" cy="3955772"/>
+            <a:off x="20074671" y="21960829"/>
+            <a:ext cx="9354509" cy="4154031"/>
           </a:xfrm>
           <a:prstGeom prst="rect">
             <a:avLst/>
@@ -3629,7 +3615,7 @@
         </p:nvCxnSpPr>
         <p:spPr>
           <a:xfrm>
-            <a:off x="0" y="39469650"/>
+            <a:off x="-36155" y="39735121"/>
             <a:ext cx="30275213" cy="0"/>
           </a:xfrm>
           <a:prstGeom prst="line">
@@ -4050,8 +4036,8 @@
         </p:nvSpPr>
         <p:spPr>
           <a:xfrm>
-            <a:off x="20117173" y="20051041"/>
-            <a:ext cx="9394305" cy="1988237"/>
+            <a:off x="20110313" y="19758778"/>
+            <a:ext cx="8841681" cy="1988237"/>
           </a:xfrm>
           <a:prstGeom prst="rect">
             <a:avLst/>
@@ -4147,7 +4133,27 @@
                 <a:latin typeface="Verdana"/>
                 <a:cs typeface="Verdana"/>
               </a:rPr>
-              <a:t> and Varian data </a:t>
+              <a:t> and </a:t>
+            </a:r>
+            <a:r>
+              <a:rPr lang="en-US" sz="2800" dirty="0" smtClean="0">
+                <a:solidFill>
+                  <a:srgbClr val="121421"/>
+                </a:solidFill>
+                <a:latin typeface="Verdana"/>
+                <a:cs typeface="Verdana"/>
+              </a:rPr>
+              <a:t>Agilent/Varian </a:t>
+            </a:r>
+            <a:r>
+              <a:rPr lang="en-US" sz="2800" dirty="0" smtClean="0">
+                <a:solidFill>
+                  <a:srgbClr val="121421"/>
+                </a:solidFill>
+                <a:latin typeface="Verdana"/>
+                <a:cs typeface="Verdana"/>
+              </a:rPr>
+              <a:t>data </a:t>
             </a:r>
             <a:r>
               <a:rPr lang="en-US" sz="2800" dirty="0">
@@ -4197,7 +4203,7 @@
         </p:nvSpPr>
         <p:spPr>
           <a:xfrm>
-            <a:off x="20142953" y="19223128"/>
+            <a:off x="20074671" y="19005540"/>
             <a:ext cx="2724912" cy="646331"/>
           </a:xfrm>
           <a:prstGeom prst="rect">
@@ -4241,7 +4247,7 @@
         </p:nvSpPr>
         <p:spPr>
           <a:xfrm>
-            <a:off x="829482" y="36620125"/>
+            <a:off x="743426" y="37031817"/>
             <a:ext cx="16677468" cy="1988237"/>
           </a:xfrm>
           <a:prstGeom prst="rect">
@@ -4291,14 +4297,14 @@
               <a:t>quantification </a:t>
             </a:r>
             <a:r>
-              <a:rPr lang="en-US" sz="2800" b="1" dirty="0">
+              <a:rPr lang="en-US" sz="2800" b="1" dirty="0" smtClean="0">
                 <a:solidFill>
                   <a:schemeClr val="accent1"/>
                 </a:solidFill>
                 <a:latin typeface="Verdana"/>
                 <a:cs typeface="Verdana"/>
               </a:rPr>
-              <a:t>data</a:t>
+              <a:t>data handling</a:t>
             </a:r>
             <a:r>
               <a:rPr lang="en-US" sz="2800" dirty="0" smtClean="0">
@@ -4308,7 +4314,17 @@
                 <a:latin typeface="Verdana"/>
                 <a:cs typeface="Verdana"/>
               </a:rPr>
-              <a:t>. Our </a:t>
+              <a:t>. </a:t>
+            </a:r>
+            <a:r>
+              <a:rPr lang="en-US" sz="2800" dirty="0" smtClean="0">
+                <a:solidFill>
+                  <a:srgbClr val="121421"/>
+                </a:solidFill>
+                <a:latin typeface="Verdana"/>
+                <a:cs typeface="Verdana"/>
+              </a:rPr>
+              <a:t>Our </a:t>
             </a:r>
             <a:r>
               <a:rPr lang="en-US" sz="2800" dirty="0">
@@ -4441,7 +4457,7 @@
         </p:blipFill>
         <p:spPr>
           <a:xfrm>
-            <a:off x="28624406" y="40100622"/>
+            <a:off x="28510339" y="40154076"/>
             <a:ext cx="1003022" cy="1264821"/>
           </a:xfrm>
           <a:prstGeom prst="rect">
@@ -4903,7 +4919,7 @@
         </p:nvSpPr>
         <p:spPr>
           <a:xfrm>
-            <a:off x="2871919" y="40100622"/>
+            <a:off x="3036994" y="40100622"/>
             <a:ext cx="12011545" cy="2322174"/>
           </a:xfrm>
           <a:prstGeom prst="rect">
@@ -5423,8 +5439,8 @@
         </p:nvSpPr>
         <p:spPr>
           <a:xfrm>
-            <a:off x="1962693" y="13043908"/>
-            <a:ext cx="6774679" cy="1200329"/>
+            <a:off x="1065385" y="13043908"/>
+            <a:ext cx="9288088" cy="646331"/>
           </a:xfrm>
           <a:prstGeom prst="rect">
             <a:avLst/>
@@ -5457,29 +5473,7 @@
                 <a:ea typeface="Verdana" pitchFamily="34" charset="0"/>
                 <a:cs typeface="Verdana" pitchFamily="34" charset="0"/>
               </a:rPr>
-              <a:t> XML </a:t>
-            </a:r>
-            <a:r>
-              <a:rPr lang="de-DE" sz="3600" b="1" dirty="0" err="1" smtClean="0">
-                <a:solidFill>
-                  <a:srgbClr val="2F3246"/>
-                </a:solidFill>
-                <a:latin typeface="Verdana" pitchFamily="34" charset="0"/>
-                <a:ea typeface="Verdana" pitchFamily="34" charset="0"/>
-                <a:cs typeface="Verdana" pitchFamily="34" charset="0"/>
-              </a:rPr>
-              <a:t>schema</a:t>
-            </a:r>
-            <a:r>
-              <a:rPr lang="de-DE" sz="3600" b="1" dirty="0" smtClean="0">
-                <a:solidFill>
-                  <a:srgbClr val="2F3246"/>
-                </a:solidFill>
-                <a:latin typeface="Verdana" pitchFamily="34" charset="0"/>
-                <a:ea typeface="Verdana" pitchFamily="34" charset="0"/>
-                <a:cs typeface="Verdana" pitchFamily="34" charset="0"/>
-              </a:rPr>
-              <a:t> </a:t>
+              <a:t> XSD </a:t>
             </a:r>
             <a:r>
               <a:rPr lang="de-DE" sz="3600" b="1" dirty="0" err="1" smtClean="0">
@@ -5511,7 +5505,7 @@
         </p:nvSpPr>
         <p:spPr>
           <a:xfrm>
-            <a:off x="12152063" y="13111096"/>
+            <a:off x="11926296" y="13111096"/>
             <a:ext cx="7075525" cy="646331"/>
           </a:xfrm>
           <a:prstGeom prst="rect">
@@ -5568,6 +5562,17 @@
                 <a:cs typeface="Verdana" pitchFamily="34" charset="0"/>
               </a:rPr>
               <a:t> </a:t>
+            </a:r>
+            <a:r>
+              <a:rPr lang="de-DE" sz="3600" b="1" dirty="0" smtClean="0">
+                <a:solidFill>
+                  <a:srgbClr val="2F3246"/>
+                </a:solidFill>
+                <a:latin typeface="Verdana" pitchFamily="34" charset="0"/>
+                <a:ea typeface="Verdana" pitchFamily="34" charset="0"/>
+                <a:cs typeface="Verdana" pitchFamily="34" charset="0"/>
+              </a:rPr>
+              <a:t>XML </a:t>
             </a:r>
             <a:r>
               <a:rPr lang="de-DE" sz="3600" b="1" dirty="0" err="1" smtClean="0">
@@ -6010,8 +6015,8 @@
         </p:nvSpPr>
         <p:spPr>
           <a:xfrm>
-            <a:off x="18031213" y="36470124"/>
-            <a:ext cx="11337950" cy="2585323"/>
+            <a:off x="18253880" y="36935983"/>
+            <a:ext cx="11400279" cy="2585323"/>
           </a:xfrm>
           <a:prstGeom prst="rect">
             <a:avLst/>
@@ -6481,7 +6486,7 @@
         <p:spPr>
           <a:xfrm>
             <a:off x="10936132" y="13988035"/>
-            <a:ext cx="8291457" cy="12034064"/>
+            <a:ext cx="8291457" cy="954107"/>
           </a:xfrm>
           <a:prstGeom prst="rect">
             <a:avLst/>
@@ -6584,1137 +6589,6 @@
           </a:p>
           <a:p>
             <a:endParaRPr lang="en-US" sz="2000" dirty="0" smtClean="0"/>
-          </a:p>
-          <a:p>
-            <a:r>
-              <a:rPr lang="en-US" sz="1200" dirty="0" smtClean="0"/>
-              <a:t>&lt;</a:t>
-            </a:r>
-            <a:r>
-              <a:rPr lang="en-US" sz="1200" dirty="0" err="1"/>
-              <a:t>nmrML</a:t>
-            </a:r>
-            <a:r>
-              <a:rPr lang="en-US" sz="1200" dirty="0"/>
-              <a:t> </a:t>
-            </a:r>
-            <a:r>
-              <a:rPr lang="en-US" sz="1200" dirty="0" err="1"/>
-              <a:t>xmlns:xsi</a:t>
-            </a:r>
-            <a:r>
-              <a:rPr lang="en-US" sz="1200" dirty="0"/>
-              <a:t>="http://www.w3.org/2001/XMLSchema-instance"</a:t>
-            </a:r>
-            <a:br>
-              <a:rPr lang="en-US" sz="1200" dirty="0"/>
-            </a:br>
-            <a:r>
-              <a:rPr lang="en-US" sz="1200" dirty="0"/>
-              <a:t> </a:t>
-            </a:r>
-            <a:r>
-              <a:rPr lang="en-US" sz="1200" dirty="0" err="1"/>
-              <a:t>xsi:schemaLocation</a:t>
-            </a:r>
-            <a:r>
-              <a:rPr lang="en-US" sz="1200" dirty="0"/>
-              <a:t>="http://nmrml.org/schema ../../../xml-schemata/nmrML.xsd"</a:t>
-            </a:r>
-            <a:br>
-              <a:rPr lang="en-US" sz="1200" dirty="0"/>
-            </a:br>
-            <a:r>
-              <a:rPr lang="en-US" sz="1200" dirty="0"/>
-              <a:t> </a:t>
-            </a:r>
-            <a:r>
-              <a:rPr lang="en-US" sz="1200" dirty="0" err="1"/>
-              <a:t>xmlns</a:t>
-            </a:r>
-            <a:r>
-              <a:rPr lang="en-US" sz="1200" dirty="0"/>
-              <a:t>="http://nmrml.org/schema" version="1.0.0"&gt;</a:t>
-            </a:r>
-          </a:p>
-          <a:p>
-            <a:r>
-              <a:rPr lang="en-US" sz="1200" dirty="0"/>
-              <a:t>    &lt;</a:t>
-            </a:r>
-            <a:r>
-              <a:rPr lang="en-US" sz="1200" dirty="0" err="1"/>
-              <a:t>cvList</a:t>
-            </a:r>
-            <a:r>
-              <a:rPr lang="en-US" sz="1200" dirty="0"/>
-              <a:t> count="2"&gt;</a:t>
-            </a:r>
-            <a:br>
-              <a:rPr lang="en-US" sz="1200" dirty="0"/>
-            </a:br>
-            <a:r>
-              <a:rPr lang="en-US" sz="1200" dirty="0"/>
-              <a:t>        &lt;cv </a:t>
-            </a:r>
-            <a:r>
-              <a:rPr lang="en-US" sz="1200" dirty="0" err="1"/>
-              <a:t>fullName</a:t>
-            </a:r>
-            <a:r>
-              <a:rPr lang="en-US" sz="1200" dirty="0"/>
-              <a:t>="</a:t>
-            </a:r>
-            <a:r>
-              <a:rPr lang="en-US" sz="1200" dirty="0" err="1"/>
-              <a:t>nmrML</a:t>
-            </a:r>
-            <a:r>
-              <a:rPr lang="en-US" sz="1200" dirty="0"/>
-              <a:t> Controlled Vocabulary" version="0.0.1" id="NMRCV" URI="http://www.nmrml.org/nmrml-cv.0.0.1.owl"/&gt;</a:t>
-            </a:r>
-            <a:br>
-              <a:rPr lang="en-US" sz="1200" dirty="0"/>
-            </a:br>
-            <a:r>
-              <a:rPr lang="en-US" sz="1200" dirty="0"/>
-              <a:t>        &lt;cv </a:t>
-            </a:r>
-            <a:r>
-              <a:rPr lang="en-US" sz="1200" dirty="0" err="1"/>
-              <a:t>fullName</a:t>
-            </a:r>
-            <a:r>
-              <a:rPr lang="en-US" sz="1200" dirty="0"/>
-              <a:t>="Unit Ontology" version="3.2.0" id="UO" URI="http://unit-ontology.googlecode.com/</a:t>
-            </a:r>
-            <a:r>
-              <a:rPr lang="en-US" sz="1200" dirty="0" err="1"/>
-              <a:t>svn</a:t>
-            </a:r>
-            <a:r>
-              <a:rPr lang="en-US" sz="1200" dirty="0"/>
-              <a:t>/trunk/</a:t>
-            </a:r>
-            <a:r>
-              <a:rPr lang="en-US" sz="1200" dirty="0" err="1"/>
-              <a:t>uo.owl</a:t>
-            </a:r>
-            <a:r>
-              <a:rPr lang="en-US" sz="1200" dirty="0"/>
-              <a:t>/"/&gt;</a:t>
-            </a:r>
-            <a:br>
-              <a:rPr lang="en-US" sz="1200" dirty="0"/>
-            </a:br>
-            <a:r>
-              <a:rPr lang="en-US" sz="1200" dirty="0"/>
-              <a:t>    &lt;/</a:t>
-            </a:r>
-            <a:r>
-              <a:rPr lang="en-US" sz="1200" dirty="0" err="1"/>
-              <a:t>cvList</a:t>
-            </a:r>
-            <a:r>
-              <a:rPr lang="en-US" sz="1200" dirty="0"/>
-              <a:t>&gt;</a:t>
-            </a:r>
-          </a:p>
-          <a:p>
-            <a:r>
-              <a:rPr lang="en-US" sz="1200" dirty="0"/>
-              <a:t/>
-            </a:r>
-            <a:br>
-              <a:rPr lang="en-US" sz="1200" dirty="0"/>
-            </a:br>
-            <a:r>
-              <a:rPr lang="en-US" sz="1200" dirty="0"/>
-              <a:t>    &lt;</a:t>
-            </a:r>
-            <a:r>
-              <a:rPr lang="en-US" sz="1200" dirty="0" err="1"/>
-              <a:t>contactList</a:t>
-            </a:r>
-            <a:r>
-              <a:rPr lang="en-US" sz="1200" dirty="0"/>
-              <a:t>&gt;</a:t>
-            </a:r>
-            <a:br>
-              <a:rPr lang="en-US" sz="1200" dirty="0"/>
-            </a:br>
-            <a:r>
-              <a:rPr lang="en-US" sz="1200" dirty="0"/>
-              <a:t>        &lt;</a:t>
-            </a:r>
-            <a:r>
-              <a:rPr lang="en-US" sz="1200" b="1" dirty="0"/>
-              <a:t>contact</a:t>
-            </a:r>
-            <a:r>
-              <a:rPr lang="en-US" sz="1200" dirty="0"/>
-              <a:t> id="ID004" </a:t>
-            </a:r>
-            <a:r>
-              <a:rPr lang="en-US" sz="1200" dirty="0" err="1"/>
-              <a:t>fullname</a:t>
-            </a:r>
-            <a:r>
-              <a:rPr lang="en-US" sz="1200" dirty="0"/>
-              <a:t>="</a:t>
-            </a:r>
-            <a:r>
-              <a:rPr lang="en-US" sz="1200" dirty="0" err="1"/>
-              <a:t>Lutger</a:t>
-            </a:r>
-            <a:r>
-              <a:rPr lang="en-US" sz="1200" dirty="0"/>
-              <a:t> A. </a:t>
-            </a:r>
-            <a:r>
-              <a:rPr lang="en-US" sz="1200" dirty="0" err="1"/>
-              <a:t>Wessjohann</a:t>
-            </a:r>
-            <a:r>
-              <a:rPr lang="en-US" sz="1200" dirty="0"/>
-              <a:t>" email="</a:t>
-            </a:r>
-            <a:r>
-              <a:rPr lang="en-US" sz="1200" dirty="0" err="1"/>
-              <a:t>Ludger.Wessjohann</a:t>
-            </a:r>
-            <a:r>
-              <a:rPr lang="en-US" sz="1200" dirty="0"/>
-              <a:t> [a] ipb-halle.de"/&gt;</a:t>
-            </a:r>
-            <a:br>
-              <a:rPr lang="en-US" sz="1200" dirty="0"/>
-            </a:br>
-            <a:r>
-              <a:rPr lang="en-US" sz="1200" dirty="0"/>
-              <a:t>        &lt;contact id="ID044" </a:t>
-            </a:r>
-            <a:r>
-              <a:rPr lang="en-US" sz="1200" dirty="0" err="1"/>
-              <a:t>fullname</a:t>
-            </a:r>
-            <a:r>
-              <a:rPr lang="en-US" sz="1200" dirty="0"/>
-              <a:t>="Mohamed A. </a:t>
-            </a:r>
-            <a:r>
-              <a:rPr lang="en-US" sz="1200" dirty="0" err="1"/>
-              <a:t>Farag</a:t>
-            </a:r>
-            <a:r>
-              <a:rPr lang="en-US" sz="1200" dirty="0"/>
-              <a:t>" email="mfarag73 [a] yahoo.com"/&gt;</a:t>
-            </a:r>
-            <a:br>
-              <a:rPr lang="en-US" sz="1200" dirty="0"/>
-            </a:br>
-            <a:r>
-              <a:rPr lang="en-US" sz="1200" dirty="0"/>
-              <a:t>    &lt;/</a:t>
-            </a:r>
-            <a:r>
-              <a:rPr lang="en-US" sz="1200" dirty="0" err="1"/>
-              <a:t>contactList</a:t>
-            </a:r>
-            <a:r>
-              <a:rPr lang="en-US" sz="1200" dirty="0"/>
-              <a:t>&gt;</a:t>
-            </a:r>
-            <a:br>
-              <a:rPr lang="en-US" sz="1200" dirty="0"/>
-            </a:br>
-            <a:r>
-              <a:rPr lang="en-US" sz="1200" dirty="0"/>
-              <a:t>    &lt;</a:t>
-            </a:r>
-            <a:r>
-              <a:rPr lang="en-US" sz="1200" dirty="0" err="1"/>
-              <a:t>sourceFileList</a:t>
-            </a:r>
-            <a:r>
-              <a:rPr lang="en-US" sz="1200" dirty="0"/>
-              <a:t> count="2"&gt;</a:t>
-            </a:r>
-            <a:br>
-              <a:rPr lang="en-US" sz="1200" dirty="0"/>
-            </a:br>
-            <a:r>
-              <a:rPr lang="en-US" sz="1200" dirty="0"/>
-              <a:t>        &lt;</a:t>
-            </a:r>
-            <a:r>
-              <a:rPr lang="en-US" sz="1200" b="1" dirty="0" err="1"/>
-              <a:t>sourceFile</a:t>
-            </a:r>
-            <a:r>
-              <a:rPr lang="en-US" sz="1200" dirty="0"/>
-              <a:t> sha1="fd99c095046e2356c7d31154d45353fa79cbc844" </a:t>
-            </a:r>
-          </a:p>
-          <a:p>
-            <a:r>
-              <a:rPr lang="en-US" sz="1200" dirty="0"/>
-              <a:t>	location=</a:t>
-            </a:r>
-            <a:r>
-              <a:rPr lang="en-US" sz="1200" dirty="0">
-                <a:hlinkClick r:id="rId15" action="ppaction://hlinkfile"/>
-              </a:rPr>
-              <a:t>file:///Users/mike/Projects/nmrML/nmrML/examples/IPB_HopExample/FIDs/FAM013</a:t>
-            </a:r>
-            <a:r>
-              <a:rPr lang="en-US" sz="1200" dirty="0" smtClean="0">
-                <a:hlinkClick r:id="rId15" action="ppaction://hlinkfile"/>
-              </a:rPr>
-              <a:t>_ </a:t>
-            </a:r>
-            <a:r>
-              <a:rPr lang="en-US" sz="1200" dirty="0" smtClean="0"/>
-              <a:t>	                </a:t>
-            </a:r>
-            <a:r>
-              <a:rPr lang="en-US" sz="1200" dirty="0" smtClean="0">
-                <a:hlinkClick r:id="rId15" action="ppaction://hlinkfile"/>
-              </a:rPr>
-              <a:t>AHTM.PROTON_04.fid/</a:t>
-            </a:r>
-            <a:r>
-              <a:rPr lang="en-US" sz="1200" dirty="0" err="1" smtClean="0">
-                <a:hlinkClick r:id="rId15" action="ppaction://hlinkfile"/>
-              </a:rPr>
-              <a:t>procpar</a:t>
-            </a:r>
-            <a:endParaRPr lang="en-US" sz="1200" dirty="0"/>
-          </a:p>
-          <a:p>
-            <a:r>
-              <a:rPr lang="en-US" sz="1200" dirty="0"/>
-              <a:t>	 id="SOURCE_FILE_0" name="</a:t>
-            </a:r>
-            <a:r>
-              <a:rPr lang="en-US" sz="1200" b="1" dirty="0" err="1"/>
-              <a:t>procpar</a:t>
-            </a:r>
-            <a:r>
-              <a:rPr lang="en-US" sz="1200" dirty="0"/>
-              <a:t>"&gt;</a:t>
-            </a:r>
-            <a:br>
-              <a:rPr lang="en-US" sz="1200" dirty="0"/>
-            </a:br>
-            <a:r>
-              <a:rPr lang="en-US" sz="1200" dirty="0"/>
-              <a:t>            &lt;</a:t>
-            </a:r>
-            <a:r>
-              <a:rPr lang="en-US" sz="1200" dirty="0" err="1"/>
-              <a:t>cvTerm</a:t>
-            </a:r>
-            <a:r>
-              <a:rPr lang="en-US" sz="1200" dirty="0"/>
-              <a:t> </a:t>
-            </a:r>
-            <a:r>
-              <a:rPr lang="en-US" sz="1200" dirty="0" err="1"/>
-              <a:t>cvRef</a:t>
-            </a:r>
-            <a:r>
-              <a:rPr lang="en-US" sz="1200" dirty="0"/>
-              <a:t>="NMRCV" accession="NMR:1400297" name="Varian VNMR Format"/&gt;</a:t>
-            </a:r>
-            <a:br>
-              <a:rPr lang="en-US" sz="1200" dirty="0"/>
-            </a:br>
-            <a:r>
-              <a:rPr lang="en-US" sz="1200" dirty="0"/>
-              <a:t>            &lt;</a:t>
-            </a:r>
-            <a:r>
-              <a:rPr lang="en-US" sz="1200" dirty="0" err="1"/>
-              <a:t>cvTerm</a:t>
-            </a:r>
-            <a:r>
-              <a:rPr lang="en-US" sz="1200" dirty="0"/>
-              <a:t> </a:t>
-            </a:r>
-            <a:r>
-              <a:rPr lang="en-US" sz="1200" dirty="0" err="1"/>
-              <a:t>cvRef</a:t>
-            </a:r>
-            <a:r>
-              <a:rPr lang="en-US" sz="1200" dirty="0"/>
-              <a:t>="NMRCV" accession="NMR:1002006" name="acquisition parameter file"/&gt;</a:t>
-            </a:r>
-            <a:br>
-              <a:rPr lang="en-US" sz="1200" dirty="0"/>
-            </a:br>
-            <a:r>
-              <a:rPr lang="en-US" sz="1200" dirty="0"/>
-              <a:t>        &lt;/</a:t>
-            </a:r>
-            <a:r>
-              <a:rPr lang="en-US" sz="1200" dirty="0" err="1"/>
-              <a:t>sourceFile</a:t>
-            </a:r>
-            <a:r>
-              <a:rPr lang="en-US" sz="1200" dirty="0"/>
-              <a:t>&gt;</a:t>
-            </a:r>
-            <a:br>
-              <a:rPr lang="en-US" sz="1200" dirty="0"/>
-            </a:br>
-            <a:r>
-              <a:rPr lang="en-US" sz="1200" dirty="0"/>
-              <a:t>        &lt;</a:t>
-            </a:r>
-            <a:r>
-              <a:rPr lang="en-US" sz="1200" dirty="0" err="1"/>
-              <a:t>sourceFile</a:t>
-            </a:r>
-            <a:r>
-              <a:rPr lang="en-US" sz="1200" dirty="0"/>
-              <a:t> sha1="e4ffeb41da28b1e9017e72819252ec6d78f8179f“</a:t>
-            </a:r>
-          </a:p>
-          <a:p>
-            <a:r>
-              <a:rPr lang="en-US" sz="1200" dirty="0"/>
-              <a:t>	 location=</a:t>
-            </a:r>
-            <a:r>
-              <a:rPr lang="en-US" sz="1200" dirty="0">
-                <a:hlinkClick r:id="rId16" action="ppaction://hlinkfile"/>
-              </a:rPr>
-              <a:t>file:///Users/mike/Projects/nmrML/nmrML/examples/IPB_HopExample/FIDs/FAM013_AHTM.PROTON_04.fid/fid</a:t>
-            </a:r>
-            <a:endParaRPr lang="en-US" sz="1200" dirty="0"/>
-          </a:p>
-          <a:p>
-            <a:r>
-              <a:rPr lang="en-US" sz="1200" dirty="0" smtClean="0"/>
-              <a:t>	 id="SOURCE_FILE_1" name="</a:t>
-            </a:r>
-            <a:r>
-              <a:rPr lang="en-US" sz="1200" b="1" dirty="0" smtClean="0"/>
-              <a:t>fid</a:t>
-            </a:r>
-            <a:r>
-              <a:rPr lang="en-US" sz="1200" dirty="0" smtClean="0"/>
-              <a:t>"&gt;</a:t>
-            </a:r>
-            <a:br>
-              <a:rPr lang="en-US" sz="1200" dirty="0" smtClean="0"/>
-            </a:br>
-            <a:r>
-              <a:rPr lang="en-US" sz="1200" dirty="0" smtClean="0"/>
-              <a:t>            &lt;</a:t>
-            </a:r>
-            <a:r>
-              <a:rPr lang="en-US" sz="1200" dirty="0" err="1" smtClean="0"/>
-              <a:t>cvTerm</a:t>
-            </a:r>
-            <a:r>
-              <a:rPr lang="en-US" sz="1200" dirty="0" smtClean="0"/>
-              <a:t> </a:t>
-            </a:r>
-            <a:r>
-              <a:rPr lang="en-US" sz="1200" dirty="0" err="1" smtClean="0"/>
-              <a:t>cvRef</a:t>
-            </a:r>
-            <a:r>
-              <a:rPr lang="en-US" sz="1200" dirty="0" smtClean="0"/>
-              <a:t>="NMRCV" accession="NMR:1400297" name="Varian VNMR Format"/&gt;</a:t>
-            </a:r>
-            <a:br>
-              <a:rPr lang="en-US" sz="1200" dirty="0" smtClean="0"/>
-            </a:br>
-            <a:r>
-              <a:rPr lang="en-US" sz="1200" dirty="0" smtClean="0"/>
-              <a:t>            &lt;</a:t>
-            </a:r>
-            <a:r>
-              <a:rPr lang="en-US" sz="1200" dirty="0" err="1" smtClean="0"/>
-              <a:t>cvTerm</a:t>
-            </a:r>
-            <a:r>
-              <a:rPr lang="en-US" sz="1200" dirty="0" smtClean="0"/>
-              <a:t> </a:t>
-            </a:r>
-            <a:r>
-              <a:rPr lang="en-US" sz="1200" dirty="0" err="1" smtClean="0"/>
-              <a:t>cvRef</a:t>
-            </a:r>
-            <a:r>
-              <a:rPr lang="en-US" sz="1200" dirty="0" smtClean="0"/>
-              <a:t>="NMRCV" accession="NMR:1400119" name="FID file"/&gt;</a:t>
-            </a:r>
-            <a:br>
-              <a:rPr lang="en-US" sz="1200" dirty="0" smtClean="0"/>
-            </a:br>
-            <a:r>
-              <a:rPr lang="en-US" sz="1200" dirty="0" smtClean="0"/>
-              <a:t>        &lt;/</a:t>
-            </a:r>
-            <a:r>
-              <a:rPr lang="en-US" sz="1200" dirty="0" err="1" smtClean="0"/>
-              <a:t>sourceFile</a:t>
-            </a:r>
-            <a:r>
-              <a:rPr lang="en-US" sz="1200" dirty="0" smtClean="0"/>
-              <a:t>&gt;</a:t>
-            </a:r>
-            <a:br>
-              <a:rPr lang="en-US" sz="1200" dirty="0" smtClean="0"/>
-            </a:br>
-            <a:r>
-              <a:rPr lang="en-US" sz="1200" dirty="0" smtClean="0"/>
-              <a:t>    &lt;/</a:t>
-            </a:r>
-            <a:r>
-              <a:rPr lang="en-US" sz="1200" dirty="0" err="1" smtClean="0"/>
-              <a:t>sourceFileList</a:t>
-            </a:r>
-            <a:r>
-              <a:rPr lang="en-US" sz="1200" dirty="0" smtClean="0"/>
-              <a:t>&gt;</a:t>
-            </a:r>
-            <a:br>
-              <a:rPr lang="en-US" sz="1200" dirty="0" smtClean="0"/>
-            </a:br>
-            <a:r>
-              <a:rPr lang="en-US" sz="1200" dirty="0" smtClean="0"/>
-              <a:t>    &lt;</a:t>
-            </a:r>
-            <a:r>
-              <a:rPr lang="en-US" sz="1200" dirty="0" err="1" smtClean="0"/>
-              <a:t>softwareList</a:t>
-            </a:r>
-            <a:r>
-              <a:rPr lang="en-US" sz="1200" dirty="0" smtClean="0"/>
-              <a:t> count="1"&gt;</a:t>
-            </a:r>
-            <a:br>
-              <a:rPr lang="en-US" sz="1200" dirty="0" smtClean="0"/>
-            </a:br>
-            <a:r>
-              <a:rPr lang="en-US" sz="1200" dirty="0" smtClean="0"/>
-              <a:t>        &lt;</a:t>
-            </a:r>
-            <a:r>
-              <a:rPr lang="en-US" sz="1200" b="1" dirty="0" smtClean="0"/>
-              <a:t>software</a:t>
-            </a:r>
-            <a:r>
-              <a:rPr lang="en-US" sz="1200" dirty="0" smtClean="0"/>
-              <a:t> </a:t>
-            </a:r>
-            <a:r>
-              <a:rPr lang="en-US" sz="1200" dirty="0" err="1" smtClean="0"/>
-              <a:t>cvRef</a:t>
-            </a:r>
-            <a:r>
-              <a:rPr lang="en-US" sz="1200" dirty="0" smtClean="0"/>
-              <a:t>="NMRCV" accession="NMR:1000277" name="</a:t>
-            </a:r>
-            <a:r>
-              <a:rPr lang="en-US" sz="1200" dirty="0" err="1" smtClean="0"/>
-              <a:t>VnmrJ</a:t>
-            </a:r>
-            <a:r>
-              <a:rPr lang="en-US" sz="1200" dirty="0" smtClean="0"/>
-              <a:t> software" version="2.2C" id="SOFTWARE_1"/&gt;</a:t>
-            </a:r>
-            <a:br>
-              <a:rPr lang="en-US" sz="1200" dirty="0" smtClean="0"/>
-            </a:br>
-            <a:r>
-              <a:rPr lang="en-US" sz="1200" dirty="0" smtClean="0"/>
-              <a:t>    &lt;/so</a:t>
-            </a:r>
-            <a:r>
-              <a:rPr lang="en-US" sz="1200" dirty="0"/>
-              <a:t>&lt;</a:t>
-            </a:r>
-            <a:r>
-              <a:rPr lang="en-US" sz="1200" dirty="0" err="1"/>
-              <a:t>instrumentConfigurationList</a:t>
-            </a:r>
-            <a:r>
-              <a:rPr lang="en-US" sz="1200" dirty="0"/>
-              <a:t> count="4"&gt;</a:t>
-            </a:r>
-            <a:br>
-              <a:rPr lang="en-US" sz="1200" dirty="0"/>
-            </a:br>
-            <a:r>
-              <a:rPr lang="en-US" sz="1200" dirty="0"/>
-              <a:t>        </a:t>
-            </a:r>
-            <a:r>
-              <a:rPr lang="en-US" sz="1200" b="1" dirty="0"/>
-              <a:t>&lt;</a:t>
-            </a:r>
-            <a:r>
-              <a:rPr lang="en-US" sz="1200" b="1" dirty="0" err="1"/>
-              <a:t>instrumentConfiguration</a:t>
-            </a:r>
-            <a:r>
-              <a:rPr lang="en-US" sz="1200" b="1" dirty="0"/>
-              <a:t> </a:t>
-            </a:r>
-            <a:r>
-              <a:rPr lang="en-US" sz="1200" dirty="0"/>
-              <a:t>id="INST_CONFIG_1"&gt;</a:t>
-            </a:r>
-            <a:br>
-              <a:rPr lang="en-US" sz="1200" dirty="0"/>
-            </a:br>
-            <a:r>
-              <a:rPr lang="en-US" sz="1200" dirty="0"/>
-              <a:t>            &lt;</a:t>
-            </a:r>
-            <a:r>
-              <a:rPr lang="en-US" sz="1200" dirty="0" err="1"/>
-              <a:t>cvTerm</a:t>
-            </a:r>
-            <a:r>
-              <a:rPr lang="en-US" sz="1200" dirty="0"/>
-              <a:t> </a:t>
-            </a:r>
-            <a:r>
-              <a:rPr lang="en-US" sz="1200" dirty="0" err="1"/>
-              <a:t>cvRef</a:t>
-            </a:r>
-            <a:r>
-              <a:rPr lang="en-US" sz="1200" dirty="0"/>
-              <a:t>="NMRCV" accession="NMR:1400234" name="</a:t>
-            </a:r>
-            <a:r>
-              <a:rPr lang="en-US" sz="1200" b="1" dirty="0"/>
-              <a:t>Varian NMR instrument</a:t>
-            </a:r>
-            <a:r>
-              <a:rPr lang="en-US" sz="1200" dirty="0"/>
-              <a:t>"/&gt;</a:t>
-            </a:r>
-            <a:br>
-              <a:rPr lang="en-US" sz="1200" dirty="0"/>
-            </a:br>
-            <a:r>
-              <a:rPr lang="en-US" sz="1200" dirty="0"/>
-              <a:t>            &lt;</a:t>
-            </a:r>
-            <a:r>
-              <a:rPr lang="en-US" sz="1200" dirty="0" err="1"/>
-              <a:t>cvTerm</a:t>
-            </a:r>
-            <a:r>
-              <a:rPr lang="en-US" sz="1200" dirty="0"/>
-              <a:t> </a:t>
-            </a:r>
-            <a:r>
-              <a:rPr lang="en-US" sz="1200" dirty="0" err="1"/>
-              <a:t>cvRef</a:t>
-            </a:r>
-            <a:r>
-              <a:rPr lang="en-US" sz="1200" dirty="0"/>
-              <a:t>="NMRCV" accession="NMR:1000235" name="Varian probe"/&gt;</a:t>
-            </a:r>
-            <a:br>
-              <a:rPr lang="en-US" sz="1200" dirty="0"/>
-            </a:br>
-            <a:r>
-              <a:rPr lang="en-US" sz="1200" dirty="0"/>
-              <a:t>            &lt;</a:t>
-            </a:r>
-            <a:r>
-              <a:rPr lang="en-US" sz="1200" dirty="0" err="1"/>
-              <a:t>cvTerm</a:t>
-            </a:r>
-            <a:r>
-              <a:rPr lang="en-US" sz="1200" dirty="0"/>
-              <a:t> </a:t>
-            </a:r>
-            <a:r>
-              <a:rPr lang="en-US" sz="1200" dirty="0" err="1"/>
-              <a:t>cvRef</a:t>
-            </a:r>
-            <a:r>
-              <a:rPr lang="en-US" sz="1200" dirty="0"/>
-              <a:t>="NMRCV" accession="NMR:1400234" name="Varian NMR instrument"/&gt;</a:t>
-            </a:r>
-            <a:br>
-              <a:rPr lang="en-US" sz="1200" dirty="0"/>
-            </a:br>
-            <a:r>
-              <a:rPr lang="en-US" sz="1200" dirty="0"/>
-              <a:t>            &lt;</a:t>
-            </a:r>
-            <a:r>
-              <a:rPr lang="en-US" sz="1200" dirty="0" err="1"/>
-              <a:t>cvTerm</a:t>
-            </a:r>
-            <a:r>
-              <a:rPr lang="en-US" sz="1200" dirty="0"/>
-              <a:t> </a:t>
-            </a:r>
-            <a:r>
-              <a:rPr lang="en-US" sz="1200" dirty="0" err="1"/>
-              <a:t>cvRef</a:t>
-            </a:r>
-            <a:r>
-              <a:rPr lang="en-US" sz="1200" dirty="0"/>
-              <a:t>="NMRCV" accession="NMR:1000236" name="</a:t>
-            </a:r>
-            <a:r>
-              <a:rPr lang="en-US" sz="1200" b="1" dirty="0"/>
-              <a:t>5mm HCN probe</a:t>
-            </a:r>
-            <a:r>
-              <a:rPr lang="en-US" sz="1200" dirty="0"/>
-              <a:t>"/&gt;</a:t>
-            </a:r>
-            <a:br>
-              <a:rPr lang="en-US" sz="1200" dirty="0"/>
-            </a:br>
-            <a:r>
-              <a:rPr lang="en-US" sz="1200" dirty="0"/>
-              <a:t>        &lt;/</a:t>
-            </a:r>
-            <a:r>
-              <a:rPr lang="en-US" sz="1200" dirty="0" err="1"/>
-              <a:t>instrumentConfiguration</a:t>
-            </a:r>
-            <a:r>
-              <a:rPr lang="en-US" sz="1200" dirty="0"/>
-              <a:t>&gt;</a:t>
-            </a:r>
-            <a:br>
-              <a:rPr lang="en-US" sz="1200" dirty="0"/>
-            </a:br>
-            <a:r>
-              <a:rPr lang="en-US" sz="1200" dirty="0"/>
-              <a:t>    &lt;/</a:t>
-            </a:r>
-            <a:r>
-              <a:rPr lang="en-US" sz="1200" dirty="0" err="1"/>
-              <a:t>instrumentConfigurationList</a:t>
-            </a:r>
-            <a:r>
-              <a:rPr lang="en-US" sz="1200" dirty="0"/>
-              <a:t>&gt;</a:t>
-            </a:r>
-          </a:p>
-          <a:p>
-            <a:r>
-              <a:rPr lang="en-US" sz="1200" b="1" dirty="0"/>
-              <a:t> &lt;acquisition&gt;</a:t>
-            </a:r>
-            <a:r>
-              <a:rPr lang="en-US" sz="1200" dirty="0"/>
-              <a:t/>
-            </a:r>
-            <a:br>
-              <a:rPr lang="en-US" sz="1200" dirty="0"/>
-            </a:br>
-            <a:r>
-              <a:rPr lang="en-US" sz="1200" dirty="0"/>
-              <a:t>        &lt;acquisition1D&gt;</a:t>
-            </a:r>
-            <a:br>
-              <a:rPr lang="en-US" sz="1200" dirty="0"/>
-            </a:br>
-            <a:r>
-              <a:rPr lang="en-US" sz="1200" dirty="0"/>
-              <a:t>            &lt;</a:t>
-            </a:r>
-            <a:r>
-              <a:rPr lang="en-US" sz="1200" dirty="0" err="1"/>
-              <a:t>acquisitionParameterSet</a:t>
-            </a:r>
-            <a:r>
-              <a:rPr lang="en-US" sz="1200" dirty="0"/>
-              <a:t> </a:t>
-            </a:r>
-            <a:r>
-              <a:rPr lang="en-US" sz="1200" dirty="0" err="1"/>
-              <a:t>numberOfScans</a:t>
-            </a:r>
-            <a:r>
-              <a:rPr lang="en-US" sz="1200" dirty="0"/>
-              <a:t>="160" </a:t>
-            </a:r>
-            <a:r>
-              <a:rPr lang="en-US" sz="1200" dirty="0" err="1"/>
-              <a:t>numberOfSteadyStateScans</a:t>
-            </a:r>
-            <a:r>
-              <a:rPr lang="en-US" sz="1200" dirty="0"/>
-              <a:t>="0"&gt;</a:t>
-            </a:r>
-            <a:br>
-              <a:rPr lang="en-US" sz="1200" dirty="0"/>
-            </a:br>
-            <a:r>
-              <a:rPr lang="en-US" sz="1200" dirty="0"/>
-              <a:t>                &lt;</a:t>
-            </a:r>
-            <a:r>
-              <a:rPr lang="en-US" sz="1200" dirty="0" err="1"/>
-              <a:t>sampleAcquisitionTemperature</a:t>
-            </a:r>
-            <a:r>
-              <a:rPr lang="en-US" sz="1200" dirty="0"/>
-              <a:t> </a:t>
-            </a:r>
-            <a:r>
-              <a:rPr lang="en-US" sz="1200" dirty="0" err="1"/>
-              <a:t>unitName</a:t>
-            </a:r>
-            <a:r>
-              <a:rPr lang="en-US" sz="1200" dirty="0"/>
-              <a:t>="kelvin" </a:t>
-            </a:r>
-            <a:r>
-              <a:rPr lang="en-US" sz="1200" dirty="0" err="1"/>
-              <a:t>unitCvRef</a:t>
-            </a:r>
-            <a:r>
-              <a:rPr lang="en-US" sz="1200" dirty="0"/>
-              <a:t>="UO" value="299.15" </a:t>
-            </a:r>
-            <a:r>
-              <a:rPr lang="en-US" sz="1200" dirty="0" err="1"/>
-              <a:t>unitAccession</a:t>
-            </a:r>
-            <a:r>
-              <a:rPr lang="en-US" sz="1200" dirty="0"/>
-              <a:t>="UO:0000012"/&gt;</a:t>
-            </a:r>
-            <a:br>
-              <a:rPr lang="en-US" sz="1200" dirty="0"/>
-            </a:br>
-            <a:r>
-              <a:rPr lang="en-US" sz="1200" dirty="0"/>
-              <a:t>                &lt;</a:t>
-            </a:r>
-            <a:r>
-              <a:rPr lang="en-US" sz="1200" dirty="0" err="1"/>
-              <a:t>spinningRate</a:t>
-            </a:r>
-            <a:r>
-              <a:rPr lang="en-US" sz="1200" dirty="0"/>
-              <a:t> </a:t>
-            </a:r>
-            <a:r>
-              <a:rPr lang="en-US" sz="1200" dirty="0" err="1"/>
-              <a:t>unitName</a:t>
-            </a:r>
-            <a:r>
-              <a:rPr lang="en-US" sz="1200" dirty="0"/>
-              <a:t>="hertz" </a:t>
-            </a:r>
-            <a:r>
-              <a:rPr lang="en-US" sz="1200" dirty="0" err="1"/>
-              <a:t>unitCvRef</a:t>
-            </a:r>
-            <a:r>
-              <a:rPr lang="en-US" sz="1200" dirty="0"/>
-              <a:t>="UO" value="0" </a:t>
-            </a:r>
-            <a:r>
-              <a:rPr lang="en-US" sz="1200" dirty="0" err="1"/>
-              <a:t>unitAccession</a:t>
-            </a:r>
-            <a:r>
-              <a:rPr lang="en-US" sz="1200" dirty="0"/>
-              <a:t>="UO:0000106"/&gt;</a:t>
-            </a:r>
-            <a:br>
-              <a:rPr lang="en-US" sz="1200" dirty="0"/>
-            </a:br>
-            <a:r>
-              <a:rPr lang="en-US" sz="1200" dirty="0"/>
-              <a:t>                &lt;</a:t>
-            </a:r>
-            <a:r>
-              <a:rPr lang="en-US" sz="1200" dirty="0" err="1"/>
-              <a:t>relaxationDelay</a:t>
-            </a:r>
-            <a:r>
-              <a:rPr lang="en-US" sz="1200" dirty="0"/>
-              <a:t> </a:t>
-            </a:r>
-            <a:r>
-              <a:rPr lang="en-US" sz="1200" dirty="0" err="1"/>
-              <a:t>unitName</a:t>
-            </a:r>
-            <a:r>
-              <a:rPr lang="en-US" sz="1200" dirty="0"/>
-              <a:t>="second" </a:t>
-            </a:r>
-            <a:r>
-              <a:rPr lang="en-US" sz="1200" dirty="0" err="1"/>
-              <a:t>unitCvRef</a:t>
-            </a:r>
-            <a:r>
-              <a:rPr lang="en-US" sz="1200" dirty="0"/>
-              <a:t>="UO" value="22.2737024" </a:t>
-            </a:r>
-            <a:r>
-              <a:rPr lang="en-US" sz="1200" dirty="0" err="1"/>
-              <a:t>unitAccession</a:t>
-            </a:r>
-            <a:r>
-              <a:rPr lang="en-US" sz="1200" dirty="0"/>
-              <a:t>="UO:0000010"/&gt;</a:t>
-            </a:r>
-            <a:br>
-              <a:rPr lang="en-US" sz="1200" dirty="0"/>
-            </a:br>
-            <a:r>
-              <a:rPr lang="en-US" sz="1200" dirty="0"/>
-              <a:t>                &lt;</a:t>
-            </a:r>
-            <a:r>
-              <a:rPr lang="en-US" sz="1200" dirty="0" err="1"/>
-              <a:t>pulseSequence</a:t>
-            </a:r>
-            <a:r>
-              <a:rPr lang="en-US" sz="1200" dirty="0"/>
-              <a:t>/&gt;</a:t>
-            </a:r>
-            <a:br>
-              <a:rPr lang="en-US" sz="1200" dirty="0"/>
-            </a:br>
-            <a:r>
-              <a:rPr lang="en-US" sz="1200" dirty="0"/>
-              <a:t>                &lt;</a:t>
-            </a:r>
-            <a:r>
-              <a:rPr lang="en-US" sz="1200" dirty="0" err="1"/>
-              <a:t>DirectDimensionParameterSet</a:t>
-            </a:r>
-            <a:r>
-              <a:rPr lang="en-US" sz="1200" dirty="0"/>
-              <a:t> </a:t>
-            </a:r>
-            <a:r>
-              <a:rPr lang="en-US" sz="1200" dirty="0" err="1"/>
-              <a:t>numberOfDataPoints</a:t>
-            </a:r>
-            <a:r>
-              <a:rPr lang="en-US" sz="1200" dirty="0"/>
-              <a:t>="65536" decoupled="false"&gt;</a:t>
-            </a:r>
-            <a:br>
-              <a:rPr lang="en-US" sz="1200" dirty="0"/>
-            </a:br>
-            <a:r>
-              <a:rPr lang="en-US" sz="1200" b="1" dirty="0"/>
-              <a:t>                    &lt;</a:t>
-            </a:r>
-            <a:r>
-              <a:rPr lang="en-US" sz="1200" b="1" dirty="0" err="1"/>
-              <a:t>acquisitionNucleus</a:t>
-            </a:r>
-            <a:r>
-              <a:rPr lang="en-US" sz="1200" b="1" dirty="0"/>
-              <a:t> </a:t>
-            </a:r>
-            <a:r>
-              <a:rPr lang="en-US" sz="1200" b="1" dirty="0" err="1"/>
-              <a:t>cvRef</a:t>
-            </a:r>
-            <a:r>
-              <a:rPr lang="en-US" sz="1200" b="1" dirty="0"/>
-              <a:t>="NMRCV" accession="NMR:1400151" name="1H"/&gt;</a:t>
-            </a:r>
-            <a:br>
-              <a:rPr lang="en-US" sz="1200" b="1" dirty="0"/>
-            </a:br>
-            <a:r>
-              <a:rPr lang="en-US" sz="1200" dirty="0"/>
-              <a:t>                    &lt;gammaB1PulseFieldStrength </a:t>
-            </a:r>
-            <a:r>
-              <a:rPr lang="en-US" sz="1200" dirty="0" err="1"/>
-              <a:t>unitName</a:t>
-            </a:r>
-            <a:r>
-              <a:rPr lang="en-US" sz="1200" dirty="0"/>
-              <a:t>="hertz" </a:t>
-            </a:r>
-            <a:r>
-              <a:rPr lang="en-US" sz="1200" dirty="0" err="1"/>
-              <a:t>unitCvRef</a:t>
-            </a:r>
-            <a:r>
-              <a:rPr lang="en-US" sz="1200" dirty="0"/>
-              <a:t>="UO" value="34482.7586207" 	</a:t>
-            </a:r>
-            <a:r>
-              <a:rPr lang="en-US" sz="1200" dirty="0" err="1"/>
-              <a:t>unitAccession</a:t>
-            </a:r>
-            <a:r>
-              <a:rPr lang="en-US" sz="1200" dirty="0"/>
-              <a:t>="UO:0000106"/&gt;</a:t>
-            </a:r>
-            <a:br>
-              <a:rPr lang="en-US" sz="1200" dirty="0"/>
-            </a:br>
-            <a:r>
-              <a:rPr lang="en-US" sz="1200" b="1" dirty="0"/>
-              <a:t>                    &lt;</a:t>
-            </a:r>
-            <a:r>
-              <a:rPr lang="en-US" sz="1200" b="1" dirty="0" err="1"/>
-              <a:t>irradiationFrequency</a:t>
-            </a:r>
-            <a:r>
-              <a:rPr lang="en-US" sz="1200" b="1" dirty="0"/>
-              <a:t> </a:t>
-            </a:r>
-            <a:r>
-              <a:rPr lang="en-US" sz="1200" b="1" dirty="0" err="1"/>
-              <a:t>unitName</a:t>
-            </a:r>
-            <a:r>
-              <a:rPr lang="en-US" sz="1200" b="1" dirty="0"/>
-              <a:t>="hertz" </a:t>
-            </a:r>
-            <a:r>
-              <a:rPr lang="en-US" sz="1200" b="1" dirty="0" err="1"/>
-              <a:t>unitCvRef</a:t>
-            </a:r>
-            <a:r>
-              <a:rPr lang="en-US" sz="1200" b="1" dirty="0"/>
-              <a:t>="UO" value="599.8311617" </a:t>
-            </a:r>
-            <a:r>
-              <a:rPr lang="en-US" sz="1200" b="1" dirty="0" err="1"/>
-              <a:t>unitAccession</a:t>
-            </a:r>
-            <a:r>
-              <a:rPr lang="en-US" sz="1200" b="1" dirty="0"/>
-              <a:t>="UO:0000106"/&gt;</a:t>
-            </a:r>
-            <a:br>
-              <a:rPr lang="en-US" sz="1200" b="1" dirty="0"/>
-            </a:br>
-            <a:r>
-              <a:rPr lang="en-US" sz="1200" dirty="0"/>
-              <a:t>                &lt;/</a:t>
-            </a:r>
-            <a:r>
-              <a:rPr lang="en-US" sz="1200" dirty="0" err="1"/>
-              <a:t>DirectDimensionParameterSet</a:t>
-            </a:r>
-            <a:r>
-              <a:rPr lang="en-US" sz="1200" dirty="0"/>
-              <a:t>&gt;</a:t>
-            </a:r>
-            <a:br>
-              <a:rPr lang="en-US" sz="1200" dirty="0"/>
-            </a:br>
-            <a:r>
-              <a:rPr lang="en-US" sz="1200" dirty="0"/>
-              <a:t>            &lt;/</a:t>
-            </a:r>
-            <a:r>
-              <a:rPr lang="en-US" sz="1200" dirty="0" err="1"/>
-              <a:t>acquisitionParameterSet</a:t>
-            </a:r>
-            <a:r>
-              <a:rPr lang="en-US" sz="1200" dirty="0"/>
-              <a:t>&gt;</a:t>
-            </a:r>
-            <a:br>
-              <a:rPr lang="en-US" sz="1200" dirty="0"/>
-            </a:br>
-            <a:r>
-              <a:rPr lang="en-US" sz="1200" dirty="0"/>
-              <a:t>            &lt;</a:t>
-            </a:r>
-            <a:r>
-              <a:rPr lang="en-US" sz="1200" b="1" dirty="0" err="1"/>
-              <a:t>fidData</a:t>
-            </a:r>
-            <a:r>
-              <a:rPr lang="en-US" sz="1200" b="1" dirty="0"/>
-              <a:t> </a:t>
-            </a:r>
-            <a:r>
-              <a:rPr lang="en-US" sz="1200" dirty="0" err="1"/>
-              <a:t>byteFormat</a:t>
-            </a:r>
-            <a:r>
-              <a:rPr lang="en-US" sz="1200" dirty="0"/>
-              <a:t>="Complex128" </a:t>
-            </a:r>
-            <a:r>
-              <a:rPr lang="en-US" sz="1200" dirty="0" err="1"/>
-              <a:t>encodedLength</a:t>
-            </a:r>
-            <a:r>
-              <a:rPr lang="en-US" sz="1200" dirty="0"/>
-              <a:t>="324160" compressed="true"&gt;eJwMl4dfzl8Ux7U3lYZKy0qiomQ	[…]&lt;/</a:t>
-            </a:r>
-            <a:r>
-              <a:rPr lang="en-US" sz="1200" dirty="0" err="1"/>
-              <a:t>fidData</a:t>
-            </a:r>
-            <a:r>
-              <a:rPr lang="en-US" sz="1200" dirty="0"/>
-              <a:t>&gt;</a:t>
-            </a:r>
-            <a:br>
-              <a:rPr lang="en-US" sz="1200" dirty="0"/>
-            </a:br>
-            <a:r>
-              <a:rPr lang="en-US" sz="1200" dirty="0"/>
-              <a:t>        &lt;/acquisition1D&gt;</a:t>
-            </a:r>
-            <a:br>
-              <a:rPr lang="en-US" sz="1200" dirty="0"/>
-            </a:br>
-            <a:r>
-              <a:rPr lang="en-US" sz="1200" dirty="0"/>
-              <a:t>    &lt;/acquisition&gt;</a:t>
-            </a:r>
-            <a:br>
-              <a:rPr lang="en-US" sz="1200" dirty="0"/>
-            </a:br>
-            <a:r>
-              <a:rPr lang="en-US" sz="1200" dirty="0"/>
-              <a:t>&lt;/</a:t>
-            </a:r>
-            <a:r>
-              <a:rPr lang="en-US" sz="1200" dirty="0" err="1"/>
-              <a:t>nmrML</a:t>
-            </a:r>
-            <a:r>
-              <a:rPr lang="en-US" sz="1200" dirty="0"/>
-              <a:t>&gt;</a:t>
-            </a:r>
-            <a:br>
-              <a:rPr lang="en-US" sz="1200" dirty="0"/>
-            </a:br>
-            <a:r>
-              <a:rPr lang="en-US" sz="1200" dirty="0" err="1" smtClean="0"/>
-              <a:t>ftwareList</a:t>
-            </a:r>
-            <a:r>
-              <a:rPr lang="en-US" sz="1200" dirty="0" smtClean="0"/>
-              <a:t>&gt;</a:t>
-            </a:r>
-            <a:endParaRPr lang="en-US" sz="1200" dirty="0"/>
           </a:p>
         </p:txBody>
       </p:sp>
@@ -7727,7 +6601,7 @@
           <p:nvPr/>
         </p:nvPicPr>
         <p:blipFill>
-          <a:blip r:embed="rId17">
+          <a:blip r:embed="rId15">
             <a:extLst>
               <a:ext uri="{28A0092B-C50C-407E-A947-70E740481C1C}">
                 <a14:useLocalDpi xmlns:a14="http://schemas.microsoft.com/office/drawing/2010/main" val="0"/>
@@ -7757,7 +6631,7 @@
           <p:nvPr/>
         </p:nvPicPr>
         <p:blipFill>
-          <a:blip r:embed="rId18">
+          <a:blip r:embed="rId16">
             <a:extLst>
               <a:ext uri="{28A0092B-C50C-407E-A947-70E740481C1C}">
                 <a14:useLocalDpi xmlns:a14="http://schemas.microsoft.com/office/drawing/2010/main" val="0"/>
@@ -7770,7 +6644,7 @@
         </p:blipFill>
         <p:spPr>
           <a:xfrm>
-            <a:off x="9774585" y="29870629"/>
+            <a:off x="9934853" y="30313632"/>
             <a:ext cx="6159769" cy="4844669"/>
           </a:xfrm>
           <a:prstGeom prst="rect">
@@ -7787,7 +6661,7 @@
           <p:nvPr/>
         </p:nvPicPr>
         <p:blipFill>
-          <a:blip r:embed="rId19">
+          <a:blip r:embed="rId17">
             <a:extLst>
               <a:ext uri="{28A0092B-C50C-407E-A947-70E740481C1C}">
                 <a14:useLocalDpi xmlns:a14="http://schemas.microsoft.com/office/drawing/2010/main" val="0"/>
@@ -7800,7 +6674,7 @@
         </p:blipFill>
         <p:spPr>
           <a:xfrm>
-            <a:off x="17132728" y="29915447"/>
+            <a:off x="17292996" y="30358450"/>
             <a:ext cx="12076167" cy="4923266"/>
           </a:xfrm>
           <a:prstGeom prst="rect">
@@ -7815,23 +6689,27 @@
             <a:graphicFrameLocks noChangeAspect="1"/>
           </p:cNvGraphicFramePr>
           <p:nvPr>
-            <p:extLst/>
+            <p:extLst>
+              <p:ext uri="{D42A27DB-BD31-4B8C-83A1-F6EECF244321}">
+                <p14:modId xmlns:p14="http://schemas.microsoft.com/office/powerpoint/2010/main" val="4061155149"/>
+              </p:ext>
+            </p:extLst>
           </p:nvPr>
         </p:nvGraphicFramePr>
         <p:xfrm>
-          <a:off x="26466226" y="40426054"/>
+          <a:off x="26396039" y="40389399"/>
           <a:ext cx="1609725" cy="781050"/>
         </p:xfrm>
         <a:graphic>
           <a:graphicData uri="http://schemas.openxmlformats.org/presentationml/2006/ole">
             <mc:AlternateContent xmlns:mc="http://schemas.openxmlformats.org/markup-compatibility/2006">
               <mc:Choice xmlns:v="urn:schemas-microsoft-com:vml" Requires="v">
-                <p:oleObj spid="_x0000_s3125" r:id="rId20" imgW="155999880" imgH="75692160" progId="">
+                <p:oleObj spid="_x0000_s3141" r:id="rId18" imgW="155999880" imgH="75692160" progId="">
                   <p:embed/>
                 </p:oleObj>
               </mc:Choice>
               <mc:Fallback>
-                <p:oleObj r:id="rId20" imgW="155999880" imgH="75692160" progId="">
+                <p:oleObj r:id="rId18" imgW="155999880" imgH="75692160" progId="">
                   <p:embed/>
                   <p:pic>
                     <p:nvPicPr>
@@ -7840,14 +6718,14 @@
                       <p:nvPr/>
                     </p:nvPicPr>
                     <p:blipFill>
-                      <a:blip r:embed="rId21"/>
+                      <a:blip r:embed="rId19"/>
                       <a:stretch>
                         <a:fillRect/>
                       </a:stretch>
                     </p:blipFill>
                     <p:spPr>
                       <a:xfrm>
-                        <a:off x="26466226" y="40426054"/>
+                        <a:off x="26396039" y="40389399"/>
                         <a:ext cx="1609725" cy="781050"/>
                       </a:xfrm>
                       <a:prstGeom prst="rect">
@@ -7870,7 +6748,7 @@
           <p:nvPr/>
         </p:nvPicPr>
         <p:blipFill>
-          <a:blip r:embed="rId22" cstate="email">
+          <a:blip r:embed="rId20" cstate="email">
             <a:extLst>
               <a:ext uri="{28A0092B-C50C-407E-A947-70E740481C1C}">
                 <a14:useLocalDpi xmlns:a14="http://schemas.microsoft.com/office/drawing/2010/main" val="0"/>
@@ -7940,7 +6818,7 @@
           <p:nvPr/>
         </p:nvPicPr>
         <p:blipFill>
-          <a:blip r:embed="rId23" cstate="email">
+          <a:blip r:embed="rId21" cstate="email">
             <a:extLst>
               <a:ext uri="{28A0092B-C50C-407E-A947-70E740481C1C}">
                 <a14:useLocalDpi xmlns:a14="http://schemas.microsoft.com/office/drawing/2010/main" val="0"/>
@@ -7954,7 +6832,7 @@
         </p:blipFill>
         <p:spPr bwMode="auto">
           <a:xfrm>
-            <a:off x="26466226" y="41509396"/>
+            <a:off x="26396039" y="41472741"/>
             <a:ext cx="2464302" cy="284561"/>
           </a:xfrm>
           <a:prstGeom prst="rect">
@@ -8057,8 +6935,8 @@
         </p:nvSpPr>
         <p:spPr>
           <a:xfrm>
-            <a:off x="823723" y="27761583"/>
-            <a:ext cx="28750574" cy="1040285"/>
+            <a:off x="876853" y="27378070"/>
+            <a:ext cx="28750574" cy="1988237"/>
           </a:xfrm>
           <a:prstGeom prst="rect">
             <a:avLst/>
@@ -8104,7 +6982,97 @@
                 <a:latin typeface="Verdana"/>
                 <a:cs typeface="Verdana"/>
               </a:rPr>
-              <a:t> which checks a data file is syntactically well formatted, sufficiently detailed with respect to data content and annotation and that aspects of </a:t>
+              <a:t> which checks </a:t>
+            </a:r>
+            <a:r>
+              <a:rPr lang="en-US" sz="2800" dirty="0" smtClean="0">
+                <a:solidFill>
+                  <a:srgbClr val="121421"/>
+                </a:solidFill>
+                <a:latin typeface="Verdana"/>
+                <a:cs typeface="Verdana"/>
+              </a:rPr>
+              <a:t>the NMR data files in a multilayered approach, i.e. ensuring the data is </a:t>
+            </a:r>
+            <a:r>
+              <a:rPr lang="en-US" sz="2800" dirty="0" smtClean="0">
+                <a:solidFill>
+                  <a:srgbClr val="121421"/>
+                </a:solidFill>
+                <a:latin typeface="Verdana"/>
+                <a:cs typeface="Verdana"/>
+              </a:rPr>
+              <a:t>syntactically well </a:t>
+            </a:r>
+            <a:r>
+              <a:rPr lang="en-US" sz="2800" dirty="0" smtClean="0">
+                <a:solidFill>
+                  <a:srgbClr val="121421"/>
+                </a:solidFill>
+                <a:latin typeface="Verdana"/>
+                <a:cs typeface="Verdana"/>
+              </a:rPr>
+              <a:t>formatted, adheres to the XSD, and is </a:t>
+            </a:r>
+            <a:r>
+              <a:rPr lang="en-US" sz="2800" dirty="0" smtClean="0">
+                <a:solidFill>
+                  <a:srgbClr val="121421"/>
+                </a:solidFill>
+                <a:latin typeface="Verdana"/>
+                <a:cs typeface="Verdana"/>
+              </a:rPr>
+              <a:t>sufficiently detailed with respect to data content and </a:t>
+            </a:r>
+            <a:r>
+              <a:rPr lang="en-US" sz="2800" dirty="0" smtClean="0">
+                <a:solidFill>
+                  <a:srgbClr val="121421"/>
+                </a:solidFill>
+                <a:latin typeface="Verdana"/>
+                <a:cs typeface="Verdana"/>
+              </a:rPr>
+              <a:t>CV annotations. The latter semantic validation exploit rules that set constraints </a:t>
+            </a:r>
+            <a:r>
+              <a:rPr lang="en-US" sz="2800" dirty="0">
+                <a:solidFill>
+                  <a:srgbClr val="121421"/>
+                </a:solidFill>
+                <a:latin typeface="Verdana"/>
+                <a:cs typeface="Verdana"/>
+              </a:rPr>
+              <a:t>on certain XML </a:t>
+            </a:r>
+            <a:r>
+              <a:rPr lang="en-US" sz="2800" dirty="0" smtClean="0">
+                <a:solidFill>
+                  <a:srgbClr val="121421"/>
+                </a:solidFill>
+                <a:latin typeface="Verdana"/>
+                <a:cs typeface="Verdana"/>
+              </a:rPr>
+              <a:t>position. </a:t>
+            </a:r>
+            <a:r>
+              <a:rPr lang="en-US" sz="2800" dirty="0" smtClean="0">
+                <a:solidFill>
+                  <a:srgbClr val="121421"/>
+                </a:solidFill>
+                <a:latin typeface="Verdana"/>
+                <a:cs typeface="Verdana"/>
+              </a:rPr>
+              <a:t>which CV term is allowed at a.  </a:t>
+            </a:r>
+            <a:r>
+              <a:rPr lang="en-US" sz="2800" dirty="0" smtClean="0">
+                <a:solidFill>
+                  <a:srgbClr val="121421"/>
+                </a:solidFill>
+                <a:latin typeface="Verdana"/>
+                <a:cs typeface="Verdana"/>
+              </a:rPr>
+              <a:t>and that aspects of </a:t>
             </a:r>
             <a:r>
               <a:rPr lang="en-US" sz="2800" b="1" dirty="0" smtClean="0">
@@ -8144,7 +7112,7 @@
         </p:nvSpPr>
         <p:spPr>
           <a:xfrm>
-            <a:off x="863247" y="26827284"/>
+            <a:off x="863247" y="26504118"/>
             <a:ext cx="8783351" cy="646331"/>
           </a:xfrm>
           <a:prstGeom prst="rect">
@@ -8232,7 +7200,7 @@
         </p:nvSpPr>
         <p:spPr>
           <a:xfrm>
-            <a:off x="797327" y="35680566"/>
+            <a:off x="797327" y="36094472"/>
             <a:ext cx="2724912" cy="646331"/>
           </a:xfrm>
           <a:prstGeom prst="rect">
@@ -8276,7 +7244,7 @@
         </p:nvSpPr>
         <p:spPr>
           <a:xfrm>
-            <a:off x="18363671" y="35526026"/>
+            <a:off x="18591371" y="36174573"/>
             <a:ext cx="6283476" cy="646331"/>
           </a:xfrm>
           <a:prstGeom prst="rect">
@@ -8459,7 +7427,7 @@
                 <a:latin typeface="Verdana" pitchFamily="34" charset="0"/>
                 <a:ea typeface="Verdana" pitchFamily="34" charset="0"/>
                 <a:cs typeface="Verdana" pitchFamily="34" charset="0"/>
-                <a:hlinkClick r:id="rId24"/>
+                <a:hlinkClick r:id="rId22"/>
               </a:rPr>
               <a:t>http://www.ebi.ac.uk/metabolights/</a:t>
             </a:r>
@@ -8514,7 +7482,7 @@
                 <a:latin typeface="Verdana" pitchFamily="34" charset="0"/>
                 <a:ea typeface="Verdana" pitchFamily="34" charset="0"/>
                 <a:cs typeface="Verdana" pitchFamily="34" charset="0"/>
-                <a:hlinkClick r:id="rId25"/>
+                <a:hlinkClick r:id="rId23"/>
               </a:rPr>
               <a:t>http://msi-workgroups.sourceforge.net/</a:t>
             </a:r>
@@ -8569,7 +7537,7 @@
                 <a:latin typeface="Verdana" pitchFamily="34" charset="0"/>
                 <a:ea typeface="Verdana" pitchFamily="34" charset="0"/>
                 <a:cs typeface="Verdana" pitchFamily="34" charset="0"/>
-                <a:hlinkClick r:id="rId26"/>
+                <a:hlinkClick r:id="rId24"/>
               </a:rPr>
               <a:t>http://mibbi.sourceforge.net/projects/CIMR.shtml</a:t>
             </a:r>
@@ -8645,9 +7613,371 @@
           </a:p>
         </p:txBody>
       </p:sp>
+      <p:sp>
+        <p:nvSpPr>
+          <p:cNvPr id="18" name="Textfeld 17"/>
+          <p:cNvSpPr txBox="1"/>
+          <p:nvPr/>
+        </p:nvSpPr>
+        <p:spPr>
+          <a:xfrm>
+            <a:off x="1531936" y="29809810"/>
+            <a:ext cx="3000501" cy="461665"/>
+          </a:xfrm>
+          <a:prstGeom prst="rect">
+            <a:avLst/>
+          </a:prstGeom>
+          <a:noFill/>
+        </p:spPr>
+        <p:txBody>
+          <a:bodyPr wrap="none" rtlCol="0">
+            <a:spAutoFit/>
+          </a:bodyPr>
+          <a:lstStyle/>
+          <a:p>
+            <a:r>
+              <a:rPr lang="de-DE" sz="2400" dirty="0" smtClean="0"/>
+              <a:t>Validation Layer </a:t>
+            </a:r>
+            <a:r>
+              <a:rPr lang="de-DE" sz="2400" dirty="0" err="1" smtClean="0"/>
+              <a:t>Onion</a:t>
+            </a:r>
+            <a:endParaRPr lang="en-US" sz="2400" dirty="0"/>
+          </a:p>
+        </p:txBody>
+      </p:sp>
+      <p:sp>
+        <p:nvSpPr>
+          <p:cNvPr id="50" name="Textfeld 49"/>
+          <p:cNvSpPr txBox="1"/>
+          <p:nvPr/>
+        </p:nvSpPr>
+        <p:spPr>
+          <a:xfrm>
+            <a:off x="17195822" y="29760155"/>
+            <a:ext cx="7679025" cy="461665"/>
+          </a:xfrm>
+          <a:prstGeom prst="rect">
+            <a:avLst/>
+          </a:prstGeom>
+          <a:noFill/>
+        </p:spPr>
+        <p:txBody>
+          <a:bodyPr wrap="none" rtlCol="0">
+            <a:spAutoFit/>
+          </a:bodyPr>
+          <a:lstStyle/>
+          <a:p>
+            <a:r>
+              <a:rPr lang="de-DE" sz="2400" dirty="0" smtClean="0"/>
+              <a:t>Validation </a:t>
+            </a:r>
+            <a:r>
+              <a:rPr lang="de-DE" sz="2400" dirty="0" err="1" smtClean="0"/>
+              <a:t>webservice</a:t>
+            </a:r>
+            <a:r>
+              <a:rPr lang="de-DE" sz="2400" dirty="0" smtClean="0"/>
+              <a:t> </a:t>
+            </a:r>
+            <a:r>
+              <a:rPr lang="de-DE" sz="2400" dirty="0" smtClean="0"/>
+              <a:t>&amp; </a:t>
+            </a:r>
+            <a:r>
+              <a:rPr lang="de-DE" sz="2400" dirty="0" err="1" smtClean="0"/>
+              <a:t>result</a:t>
+            </a:r>
+            <a:r>
+              <a:rPr lang="de-DE" sz="2400" dirty="0" smtClean="0"/>
+              <a:t> </a:t>
+            </a:r>
+            <a:r>
+              <a:rPr lang="de-DE" sz="2400" dirty="0" err="1" smtClean="0"/>
+              <a:t>of</a:t>
+            </a:r>
+            <a:r>
+              <a:rPr lang="de-DE" sz="2400" dirty="0" smtClean="0"/>
+              <a:t> </a:t>
+            </a:r>
+            <a:r>
+              <a:rPr lang="de-DE" sz="2400" dirty="0" err="1" smtClean="0"/>
+              <a:t>schema</a:t>
+            </a:r>
+            <a:r>
+              <a:rPr lang="de-DE" sz="2400" dirty="0" smtClean="0"/>
+              <a:t> </a:t>
+            </a:r>
+            <a:r>
+              <a:rPr lang="de-DE" sz="2400" dirty="0" err="1" smtClean="0"/>
+              <a:t>compliance</a:t>
+            </a:r>
+            <a:r>
+              <a:rPr lang="de-DE" sz="2400" dirty="0" smtClean="0"/>
+              <a:t> check</a:t>
+            </a:r>
+            <a:endParaRPr lang="en-US" sz="2400" dirty="0"/>
+          </a:p>
+        </p:txBody>
+      </p:sp>
+      <p:sp>
+        <p:nvSpPr>
+          <p:cNvPr id="51" name="Textfeld 50"/>
+          <p:cNvSpPr txBox="1"/>
+          <p:nvPr/>
+        </p:nvSpPr>
+        <p:spPr>
+          <a:xfrm>
+            <a:off x="9934853" y="29731889"/>
+            <a:ext cx="5529206" cy="461665"/>
+          </a:xfrm>
+          <a:prstGeom prst="rect">
+            <a:avLst/>
+          </a:prstGeom>
+          <a:noFill/>
+        </p:spPr>
+        <p:txBody>
+          <a:bodyPr wrap="none" rtlCol="0">
+            <a:spAutoFit/>
+          </a:bodyPr>
+          <a:lstStyle/>
+          <a:p>
+            <a:r>
+              <a:rPr lang="de-DE" sz="2400" dirty="0" smtClean="0"/>
+              <a:t>Validation </a:t>
+            </a:r>
+            <a:r>
+              <a:rPr lang="de-DE" sz="2400" dirty="0" err="1" smtClean="0"/>
+              <a:t>rules</a:t>
+            </a:r>
+            <a:r>
+              <a:rPr lang="de-DE" sz="2400" dirty="0" smtClean="0"/>
+              <a:t> (</a:t>
+            </a:r>
+            <a:r>
+              <a:rPr lang="de-DE" sz="2400" dirty="0" err="1" smtClean="0"/>
+              <a:t>html</a:t>
+            </a:r>
+            <a:r>
+              <a:rPr lang="de-DE" sz="2400" dirty="0" smtClean="0"/>
+              <a:t>) </a:t>
+            </a:r>
+            <a:r>
+              <a:rPr lang="de-DE" sz="2400" dirty="0" err="1" smtClean="0"/>
+              <a:t>for</a:t>
+            </a:r>
+            <a:r>
+              <a:rPr lang="de-DE" sz="2400" dirty="0" smtClean="0"/>
+              <a:t> </a:t>
+            </a:r>
+            <a:r>
+              <a:rPr lang="de-DE" sz="2400" dirty="0" err="1"/>
+              <a:t>s</a:t>
+            </a:r>
+            <a:r>
+              <a:rPr lang="de-DE" sz="2400" dirty="0" err="1" smtClean="0"/>
+              <a:t>emantic</a:t>
+            </a:r>
+            <a:r>
+              <a:rPr lang="de-DE" sz="2400" dirty="0" smtClean="0"/>
+              <a:t> </a:t>
+            </a:r>
+            <a:r>
+              <a:rPr lang="de-DE" sz="2400" dirty="0" err="1" smtClean="0"/>
+              <a:t>checks</a:t>
+            </a:r>
+            <a:endParaRPr lang="en-US" sz="2400" dirty="0"/>
+          </a:p>
+        </p:txBody>
+      </p:sp>
       <p:pic>
         <p:nvPicPr>
-          <p:cNvPr id="14" name="Grafik 13"/>
+          <p:cNvPr id="29" name="Grafik 28"/>
+          <p:cNvPicPr>
+            <a:picLocks noChangeAspect="1"/>
+          </p:cNvPicPr>
+          <p:nvPr/>
+        </p:nvPicPr>
+        <p:blipFill>
+          <a:blip r:embed="rId25">
+            <a:extLst>
+              <a:ext uri="{28A0092B-C50C-407E-A947-70E740481C1C}">
+                <a14:useLocalDpi xmlns:a14="http://schemas.microsoft.com/office/drawing/2010/main" val="0"/>
+              </a:ext>
+            </a:extLst>
+          </a:blip>
+          <a:stretch>
+            <a:fillRect/>
+          </a:stretch>
+        </p:blipFill>
+        <p:spPr>
+          <a:xfrm>
+            <a:off x="20436407" y="22079802"/>
+            <a:ext cx="8575443" cy="3819552"/>
+          </a:xfrm>
+          <a:prstGeom prst="rect">
+            <a:avLst/>
+          </a:prstGeom>
+        </p:spPr>
+      </p:pic>
+      <p:pic>
+        <p:nvPicPr>
+          <p:cNvPr id="93" name="Picture 1"/>
+          <p:cNvPicPr/>
+          <p:nvPr/>
+        </p:nvPicPr>
+        <p:blipFill>
+          <a:blip r:embed="rId26"/>
+          <a:stretch>
+            <a:fillRect/>
+          </a:stretch>
+        </p:blipFill>
+        <p:spPr>
+          <a:xfrm>
+            <a:off x="602552" y="40102636"/>
+            <a:ext cx="2017080" cy="1371960"/>
+          </a:xfrm>
+          <a:prstGeom prst="rect">
+            <a:avLst/>
+          </a:prstGeom>
+        </p:spPr>
+      </p:pic>
+      <p:sp>
+        <p:nvSpPr>
+          <p:cNvPr id="94" name="CustomShape 46"/>
+          <p:cNvSpPr/>
+          <p:nvPr/>
+        </p:nvSpPr>
+        <p:spPr>
+          <a:xfrm>
+            <a:off x="578108" y="41497996"/>
+            <a:ext cx="1875960" cy="820440"/>
+          </a:xfrm>
+          <a:prstGeom prst="rect">
+            <a:avLst/>
+          </a:prstGeom>
+        </p:spPr>
+        <p:txBody>
+          <a:bodyPr lIns="90000" tIns="45000" rIns="90000" bIns="45000"/>
+          <a:lstStyle>
+            <a:defPPr>
+              <a:defRPr lang="en-US"/>
+            </a:defPPr>
+            <a:lvl1pPr marL="0" algn="l" defTabSz="914400" rtl="0" eaLnBrk="1" latinLnBrk="0" hangingPunct="1">
+              <a:defRPr sz="1800" kern="1200">
+                <a:solidFill>
+                  <a:schemeClr val="tx1"/>
+                </a:solidFill>
+                <a:latin typeface="+mn-lt"/>
+                <a:ea typeface="+mn-ea"/>
+                <a:cs typeface="+mn-cs"/>
+              </a:defRPr>
+            </a:lvl1pPr>
+            <a:lvl2pPr marL="457200" algn="l" defTabSz="914400" rtl="0" eaLnBrk="1" latinLnBrk="0" hangingPunct="1">
+              <a:defRPr sz="1800" kern="1200">
+                <a:solidFill>
+                  <a:schemeClr val="tx1"/>
+                </a:solidFill>
+                <a:latin typeface="+mn-lt"/>
+                <a:ea typeface="+mn-ea"/>
+                <a:cs typeface="+mn-cs"/>
+              </a:defRPr>
+            </a:lvl2pPr>
+            <a:lvl3pPr marL="914400" algn="l" defTabSz="914400" rtl="0" eaLnBrk="1" latinLnBrk="0" hangingPunct="1">
+              <a:defRPr sz="1800" kern="1200">
+                <a:solidFill>
+                  <a:schemeClr val="tx1"/>
+                </a:solidFill>
+                <a:latin typeface="+mn-lt"/>
+                <a:ea typeface="+mn-ea"/>
+                <a:cs typeface="+mn-cs"/>
+              </a:defRPr>
+            </a:lvl3pPr>
+            <a:lvl4pPr marL="1371600" algn="l" defTabSz="914400" rtl="0" eaLnBrk="1" latinLnBrk="0" hangingPunct="1">
+              <a:defRPr sz="1800" kern="1200">
+                <a:solidFill>
+                  <a:schemeClr val="tx1"/>
+                </a:solidFill>
+                <a:latin typeface="+mn-lt"/>
+                <a:ea typeface="+mn-ea"/>
+                <a:cs typeface="+mn-cs"/>
+              </a:defRPr>
+            </a:lvl4pPr>
+            <a:lvl5pPr marL="1828800" algn="l" defTabSz="914400" rtl="0" eaLnBrk="1" latinLnBrk="0" hangingPunct="1">
+              <a:defRPr sz="1800" kern="1200">
+                <a:solidFill>
+                  <a:schemeClr val="tx1"/>
+                </a:solidFill>
+                <a:latin typeface="+mn-lt"/>
+                <a:ea typeface="+mn-ea"/>
+                <a:cs typeface="+mn-cs"/>
+              </a:defRPr>
+            </a:lvl5pPr>
+            <a:lvl6pPr marL="2286000" algn="l" defTabSz="914400" rtl="0" eaLnBrk="1" latinLnBrk="0" hangingPunct="1">
+              <a:defRPr sz="1800" kern="1200">
+                <a:solidFill>
+                  <a:schemeClr val="tx1"/>
+                </a:solidFill>
+                <a:latin typeface="+mn-lt"/>
+                <a:ea typeface="+mn-ea"/>
+                <a:cs typeface="+mn-cs"/>
+              </a:defRPr>
+            </a:lvl6pPr>
+            <a:lvl7pPr marL="2743200" algn="l" defTabSz="914400" rtl="0" eaLnBrk="1" latinLnBrk="0" hangingPunct="1">
+              <a:defRPr sz="1800" kern="1200">
+                <a:solidFill>
+                  <a:schemeClr val="tx1"/>
+                </a:solidFill>
+                <a:latin typeface="+mn-lt"/>
+                <a:ea typeface="+mn-ea"/>
+                <a:cs typeface="+mn-cs"/>
+              </a:defRPr>
+            </a:lvl7pPr>
+            <a:lvl8pPr marL="3200400" algn="l" defTabSz="914400" rtl="0" eaLnBrk="1" latinLnBrk="0" hangingPunct="1">
+              <a:defRPr sz="1800" kern="1200">
+                <a:solidFill>
+                  <a:schemeClr val="tx1"/>
+                </a:solidFill>
+                <a:latin typeface="+mn-lt"/>
+                <a:ea typeface="+mn-ea"/>
+                <a:cs typeface="+mn-cs"/>
+              </a:defRPr>
+            </a:lvl8pPr>
+            <a:lvl9pPr marL="3657600" algn="l" defTabSz="914400" rtl="0" eaLnBrk="1" latinLnBrk="0" hangingPunct="1">
+              <a:defRPr sz="1800" kern="1200">
+                <a:solidFill>
+                  <a:schemeClr val="tx1"/>
+                </a:solidFill>
+                <a:latin typeface="+mn-lt"/>
+                <a:ea typeface="+mn-ea"/>
+                <a:cs typeface="+mn-cs"/>
+              </a:defRPr>
+            </a:lvl9pPr>
+          </a:lstStyle>
+          <a:p>
+            <a:pPr algn="ctr">
+              <a:lnSpc>
+                <a:spcPct val="100000"/>
+              </a:lnSpc>
+            </a:pPr>
+            <a:r>
+              <a:rPr lang="en-US" sz="1200" dirty="0">
+                <a:solidFill>
+                  <a:srgbClr val="000000"/>
+                </a:solidFill>
+                <a:latin typeface="Verdana"/>
+                <a:ea typeface="Verdana"/>
+              </a:rPr>
+              <a:t>This project is funded through European Commission COSMOS Grant EC312941</a:t>
+            </a:r>
+            <a:endParaRPr dirty="0"/>
+          </a:p>
+        </p:txBody>
+      </p:sp>
+      <p:pic>
+        <p:nvPicPr>
+          <p:cNvPr id="39" name="Grafik 38"/>
           <p:cNvPicPr>
             <a:picLocks noChangeAspect="1"/>
           </p:cNvPicPr>
@@ -8667,136 +7997,74 @@
         </p:blipFill>
         <p:spPr>
           <a:xfrm>
-            <a:off x="1326464" y="29874853"/>
-            <a:ext cx="7184352" cy="4826987"/>
+            <a:off x="27628190" y="1916580"/>
+            <a:ext cx="2026009" cy="1866793"/>
           </a:xfrm>
           <a:prstGeom prst="rect">
             <a:avLst/>
           </a:prstGeom>
         </p:spPr>
       </p:pic>
-      <p:sp>
-        <p:nvSpPr>
-          <p:cNvPr id="18" name="Textfeld 17"/>
-          <p:cNvSpPr txBox="1"/>
+      <p:pic>
+        <p:nvPicPr>
+          <p:cNvPr id="9" name="Grafik 8"/>
+          <p:cNvPicPr>
+            <a:picLocks noChangeAspect="1"/>
+          </p:cNvPicPr>
           <p:nvPr/>
-        </p:nvSpPr>
+        </p:nvPicPr>
+        <p:blipFill>
+          <a:blip r:embed="rId28">
+            <a:extLst>
+              <a:ext uri="{28A0092B-C50C-407E-A947-70E740481C1C}">
+                <a14:useLocalDpi xmlns:a14="http://schemas.microsoft.com/office/drawing/2010/main" val="0"/>
+              </a:ext>
+            </a:extLst>
+          </a:blip>
+          <a:stretch>
+            <a:fillRect/>
+          </a:stretch>
+        </p:blipFill>
         <p:spPr>
           <a:xfrm>
-            <a:off x="1371668" y="29366807"/>
-            <a:ext cx="3000501" cy="461665"/>
+            <a:off x="10895175" y="14999230"/>
+            <a:ext cx="8590950" cy="10624963"/>
           </a:xfrm>
           <a:prstGeom prst="rect">
             <a:avLst/>
           </a:prstGeom>
-          <a:noFill/>
         </p:spPr>
-        <p:txBody>
-          <a:bodyPr wrap="none" rtlCol="0">
-            <a:spAutoFit/>
-          </a:bodyPr>
-          <a:lstStyle/>
-          <a:p>
-            <a:r>
-              <a:rPr lang="de-DE" sz="2400" dirty="0" smtClean="0"/>
-              <a:t>Validation Layer </a:t>
-            </a:r>
-            <a:r>
-              <a:rPr lang="de-DE" sz="2400" dirty="0" err="1" smtClean="0"/>
-              <a:t>Onion</a:t>
-            </a:r>
-            <a:endParaRPr lang="en-US" sz="2400" dirty="0"/>
-          </a:p>
-        </p:txBody>
-      </p:sp>
-      <p:sp>
-        <p:nvSpPr>
-          <p:cNvPr id="50" name="Textfeld 49"/>
-          <p:cNvSpPr txBox="1"/>
+      </p:pic>
+      <p:pic>
+        <p:nvPicPr>
+          <p:cNvPr id="8" name="Grafik 7"/>
+          <p:cNvPicPr>
+            <a:picLocks noChangeAspect="1"/>
+          </p:cNvPicPr>
           <p:nvPr/>
-        </p:nvSpPr>
+        </p:nvPicPr>
+        <p:blipFill>
+          <a:blip r:embed="rId29">
+            <a:extLst>
+              <a:ext uri="{28A0092B-C50C-407E-A947-70E740481C1C}">
+                <a14:useLocalDpi xmlns:a14="http://schemas.microsoft.com/office/drawing/2010/main" val="0"/>
+              </a:ext>
+            </a:extLst>
+          </a:blip>
+          <a:stretch>
+            <a:fillRect/>
+          </a:stretch>
+        </p:blipFill>
         <p:spPr>
           <a:xfrm>
-            <a:off x="17035554" y="29317152"/>
-            <a:ext cx="3972882" cy="461665"/>
+            <a:off x="25320535" y="562293"/>
+            <a:ext cx="4537683" cy="1206930"/>
           </a:xfrm>
           <a:prstGeom prst="rect">
             <a:avLst/>
           </a:prstGeom>
-          <a:noFill/>
         </p:spPr>
-        <p:txBody>
-          <a:bodyPr wrap="none" rtlCol="0">
-            <a:spAutoFit/>
-          </a:bodyPr>
-          <a:lstStyle/>
-          <a:p>
-            <a:r>
-              <a:rPr lang="de-DE" sz="2400" dirty="0" smtClean="0"/>
-              <a:t>Validation </a:t>
-            </a:r>
-            <a:r>
-              <a:rPr lang="de-DE" sz="2400" dirty="0" err="1" smtClean="0"/>
-              <a:t>webservice</a:t>
-            </a:r>
-            <a:r>
-              <a:rPr lang="de-DE" sz="2400" dirty="0" smtClean="0"/>
-              <a:t> &amp; </a:t>
-            </a:r>
-            <a:r>
-              <a:rPr lang="de-DE" sz="2400" dirty="0" err="1" smtClean="0"/>
-              <a:t>result</a:t>
-            </a:r>
-            <a:endParaRPr lang="en-US" sz="2400" dirty="0"/>
-          </a:p>
-        </p:txBody>
-      </p:sp>
-      <p:sp>
-        <p:nvSpPr>
-          <p:cNvPr id="51" name="Textfeld 50"/>
-          <p:cNvSpPr txBox="1"/>
-          <p:nvPr/>
-        </p:nvSpPr>
-        <p:spPr>
-          <a:xfrm>
-            <a:off x="9774585" y="29288886"/>
-            <a:ext cx="2925353" cy="461665"/>
-          </a:xfrm>
-          <a:prstGeom prst="rect">
-            <a:avLst/>
-          </a:prstGeom>
-          <a:noFill/>
-        </p:spPr>
-        <p:txBody>
-          <a:bodyPr wrap="none" rtlCol="0">
-            <a:spAutoFit/>
-          </a:bodyPr>
-          <a:lstStyle/>
-          <a:p>
-            <a:r>
-              <a:rPr lang="de-DE" sz="2400" dirty="0" smtClean="0"/>
-              <a:t>Validation </a:t>
-            </a:r>
-            <a:r>
-              <a:rPr lang="de-DE" sz="2400" dirty="0" err="1" smtClean="0"/>
-              <a:t>rules</a:t>
-            </a:r>
-            <a:r>
-              <a:rPr lang="de-DE" sz="2400" dirty="0" smtClean="0"/>
-              <a:t> (</a:t>
-            </a:r>
-            <a:r>
-              <a:rPr lang="de-DE" sz="2400" dirty="0" err="1" smtClean="0"/>
-              <a:t>html</a:t>
-            </a:r>
-            <a:r>
-              <a:rPr lang="de-DE" sz="2400" dirty="0" smtClean="0"/>
-              <a:t>)</a:t>
-            </a:r>
-            <a:endParaRPr lang="en-US" sz="2400" dirty="0"/>
-          </a:p>
-        </p:txBody>
-      </p:sp>
+      </p:pic>
       <p:sp>
         <p:nvSpPr>
           <p:cNvPr id="25" name="Pfeil nach rechts 24"/>
@@ -8804,9 +8072,9 @@
           <p:nvPr/>
         </p:nvSpPr>
         <p:spPr>
-          <a:xfrm rot="1004072">
-            <a:off x="8108438" y="22283085"/>
-            <a:ext cx="3505869" cy="102933"/>
+          <a:xfrm rot="1387176">
+            <a:off x="7985129" y="22255047"/>
+            <a:ext cx="4011373" cy="125908"/>
           </a:xfrm>
           <a:prstGeom prst="rightArrow">
             <a:avLst/>
@@ -8841,6 +8109,63 @@
           </a:p>
         </p:txBody>
       </p:sp>
+      <p:graphicFrame>
+        <p:nvGraphicFramePr>
+          <p:cNvPr id="10" name="Objekt 9"/>
+          <p:cNvGraphicFramePr>
+            <a:graphicFrameLocks noChangeAspect="1"/>
+          </p:cNvGraphicFramePr>
+          <p:nvPr>
+            <p:extLst>
+              <p:ext uri="{D42A27DB-BD31-4B8C-83A1-F6EECF244321}">
+                <p14:modId xmlns:p14="http://schemas.microsoft.com/office/powerpoint/2010/main" val="4158038701"/>
+              </p:ext>
+            </p:extLst>
+          </p:nvPr>
+        </p:nvGraphicFramePr>
+        <p:xfrm>
+          <a:off x="1156053" y="30193554"/>
+          <a:ext cx="7910090" cy="5088162"/>
+        </p:xfrm>
+        <a:graphic>
+          <a:graphicData uri="http://schemas.openxmlformats.org/presentationml/2006/ole">
+            <mc:AlternateContent xmlns:mc="http://schemas.openxmlformats.org/markup-compatibility/2006">
+              <mc:Choice xmlns:v="urn:schemas-microsoft-com:vml" Requires="v">
+                <p:oleObj spid="_x0000_s3142" r:id="rId30" imgW="9536400" imgH="6133320" progId="">
+                  <p:embed/>
+                </p:oleObj>
+              </mc:Choice>
+              <mc:Fallback>
+                <p:oleObj r:id="rId30" imgW="9536400" imgH="6133320" progId="">
+                  <p:embed/>
+                  <p:pic>
+                    <p:nvPicPr>
+                      <p:cNvPr id="0" name=""/>
+                      <p:cNvPicPr/>
+                      <p:nvPr/>
+                    </p:nvPicPr>
+                    <p:blipFill>
+                      <a:blip r:embed="rId31"/>
+                      <a:stretch>
+                        <a:fillRect/>
+                      </a:stretch>
+                    </p:blipFill>
+                    <p:spPr>
+                      <a:xfrm>
+                        <a:off x="1156053" y="30193554"/>
+                        <a:ext cx="7910090" cy="5088162"/>
+                      </a:xfrm>
+                      <a:prstGeom prst="rect">
+                        <a:avLst/>
+                      </a:prstGeom>
+                    </p:spPr>
+                  </p:pic>
+                </p:oleObj>
+              </mc:Fallback>
+            </mc:AlternateContent>
+          </a:graphicData>
+        </a:graphic>
+      </p:graphicFrame>
       <p:sp>
         <p:nvSpPr>
           <p:cNvPr id="55" name="Pfeil nach rechts 54"/>
@@ -8848,9 +8173,9 @@
           <p:nvPr/>
         </p:nvSpPr>
         <p:spPr>
-          <a:xfrm rot="1237141">
-            <a:off x="7266297" y="32245313"/>
-            <a:ext cx="2512940" cy="296192"/>
+          <a:xfrm rot="672030">
+            <a:off x="8623999" y="32665230"/>
+            <a:ext cx="1281389" cy="372899"/>
           </a:xfrm>
           <a:prstGeom prst="rightArrow">
             <a:avLst/>
@@ -8859,6 +8184,7 @@
             <a:schemeClr val="tx2">
               <a:lumMod val="20000"/>
               <a:lumOff val="80000"/>
+              <a:alpha val="20000"/>
             </a:schemeClr>
           </a:solidFill>
         </p:spPr>
@@ -8892,9 +8218,9 @@
           <p:nvPr/>
         </p:nvSpPr>
         <p:spPr>
-          <a:xfrm rot="941494">
-            <a:off x="5383456" y="31745619"/>
-            <a:ext cx="11726285" cy="359839"/>
+          <a:xfrm rot="902938">
+            <a:off x="7865206" y="32952329"/>
+            <a:ext cx="9573271" cy="456049"/>
           </a:xfrm>
           <a:prstGeom prst="rightArrow">
             <a:avLst/>
@@ -8903,6 +8229,7 @@
             <a:schemeClr val="tx2">
               <a:lumMod val="20000"/>
               <a:lumOff val="80000"/>
+              <a:alpha val="21000"/>
             </a:schemeClr>
           </a:solidFill>
         </p:spPr>
@@ -8929,250 +8256,51 @@
           </a:p>
         </p:txBody>
       </p:sp>
-      <p:pic>
-        <p:nvPicPr>
-          <p:cNvPr id="29" name="Grafik 28"/>
-          <p:cNvPicPr>
-            <a:picLocks noChangeAspect="1"/>
-          </p:cNvPicPr>
+      <p:sp>
+        <p:nvSpPr>
+          <p:cNvPr id="58" name="Pfeil nach rechts 57"/>
+          <p:cNvSpPr/>
           <p:nvPr/>
-        </p:nvPicPr>
-        <p:blipFill>
-          <a:blip r:embed="rId28">
-            <a:extLst>
-              <a:ext uri="{28A0092B-C50C-407E-A947-70E740481C1C}">
-                <a14:useLocalDpi xmlns:a14="http://schemas.microsoft.com/office/drawing/2010/main" val="0"/>
-              </a:ext>
-            </a:extLst>
-          </a:blip>
-          <a:stretch>
-            <a:fillRect/>
-          </a:stretch>
-        </p:blipFill>
+        </p:nvSpPr>
         <p:spPr>
-          <a:xfrm>
-            <a:off x="20650729" y="22405626"/>
-            <a:ext cx="8279799" cy="3386063"/>
+          <a:xfrm rot="847836">
+            <a:off x="7629816" y="32130682"/>
+            <a:ext cx="9760712" cy="410742"/>
           </a:xfrm>
-          <a:prstGeom prst="rect">
+          <a:prstGeom prst="rightArrow">
             <a:avLst/>
           </a:prstGeom>
+          <a:solidFill>
+            <a:schemeClr val="tx2">
+              <a:lumMod val="20000"/>
+              <a:lumOff val="80000"/>
+              <a:alpha val="20000"/>
+            </a:schemeClr>
+          </a:solidFill>
         </p:spPr>
-      </p:pic>
-      <p:pic>
-        <p:nvPicPr>
-          <p:cNvPr id="93" name="Picture 1"/>
-          <p:cNvPicPr/>
-          <p:nvPr/>
-        </p:nvPicPr>
-        <p:blipFill>
-          <a:blip r:embed="rId29"/>
-          <a:stretch>
-            <a:fillRect/>
-          </a:stretch>
-        </p:blipFill>
-        <p:spPr>
-          <a:xfrm>
-            <a:off x="329058" y="40102636"/>
-            <a:ext cx="2017080" cy="1371960"/>
-          </a:xfrm>
-          <a:prstGeom prst="rect">
-            <a:avLst/>
-          </a:prstGeom>
-        </p:spPr>
-      </p:pic>
-      <p:sp>
-        <p:nvSpPr>
-          <p:cNvPr id="94" name="CustomShape 46"/>
-          <p:cNvSpPr/>
-          <p:nvPr/>
-        </p:nvSpPr>
-        <p:spPr>
-          <a:xfrm>
-            <a:off x="420138" y="41497996"/>
-            <a:ext cx="1875960" cy="820440"/>
-          </a:xfrm>
-          <a:prstGeom prst="rect">
-            <a:avLst/>
-          </a:prstGeom>
-        </p:spPr>
-        <p:txBody>
-          <a:bodyPr lIns="90000" tIns="45000" rIns="90000" bIns="45000"/>
-          <a:lstStyle>
-            <a:defPPr>
-              <a:defRPr lang="en-US"/>
-            </a:defPPr>
-            <a:lvl1pPr marL="0" algn="l" defTabSz="914400" rtl="0" eaLnBrk="1" latinLnBrk="0" hangingPunct="1">
-              <a:defRPr sz="1800" kern="1200">
-                <a:solidFill>
-                  <a:schemeClr val="tx1"/>
-                </a:solidFill>
-                <a:latin typeface="+mn-lt"/>
-                <a:ea typeface="+mn-ea"/>
-                <a:cs typeface="+mn-cs"/>
-              </a:defRPr>
-            </a:lvl1pPr>
-            <a:lvl2pPr marL="457200" algn="l" defTabSz="914400" rtl="0" eaLnBrk="1" latinLnBrk="0" hangingPunct="1">
-              <a:defRPr sz="1800" kern="1200">
-                <a:solidFill>
-                  <a:schemeClr val="tx1"/>
-                </a:solidFill>
-                <a:latin typeface="+mn-lt"/>
-                <a:ea typeface="+mn-ea"/>
-                <a:cs typeface="+mn-cs"/>
-              </a:defRPr>
-            </a:lvl2pPr>
-            <a:lvl3pPr marL="914400" algn="l" defTabSz="914400" rtl="0" eaLnBrk="1" latinLnBrk="0" hangingPunct="1">
-              <a:defRPr sz="1800" kern="1200">
-                <a:solidFill>
-                  <a:schemeClr val="tx1"/>
-                </a:solidFill>
-                <a:latin typeface="+mn-lt"/>
-                <a:ea typeface="+mn-ea"/>
-                <a:cs typeface="+mn-cs"/>
-              </a:defRPr>
-            </a:lvl3pPr>
-            <a:lvl4pPr marL="1371600" algn="l" defTabSz="914400" rtl="0" eaLnBrk="1" latinLnBrk="0" hangingPunct="1">
-              <a:defRPr sz="1800" kern="1200">
-                <a:solidFill>
-                  <a:schemeClr val="tx1"/>
-                </a:solidFill>
-                <a:latin typeface="+mn-lt"/>
-                <a:ea typeface="+mn-ea"/>
-                <a:cs typeface="+mn-cs"/>
-              </a:defRPr>
-            </a:lvl4pPr>
-            <a:lvl5pPr marL="1828800" algn="l" defTabSz="914400" rtl="0" eaLnBrk="1" latinLnBrk="0" hangingPunct="1">
-              <a:defRPr sz="1800" kern="1200">
-                <a:solidFill>
-                  <a:schemeClr val="tx1"/>
-                </a:solidFill>
-                <a:latin typeface="+mn-lt"/>
-                <a:ea typeface="+mn-ea"/>
-                <a:cs typeface="+mn-cs"/>
-              </a:defRPr>
-            </a:lvl5pPr>
-            <a:lvl6pPr marL="2286000" algn="l" defTabSz="914400" rtl="0" eaLnBrk="1" latinLnBrk="0" hangingPunct="1">
-              <a:defRPr sz="1800" kern="1200">
-                <a:solidFill>
-                  <a:schemeClr val="tx1"/>
-                </a:solidFill>
-                <a:latin typeface="+mn-lt"/>
-                <a:ea typeface="+mn-ea"/>
-                <a:cs typeface="+mn-cs"/>
-              </a:defRPr>
-            </a:lvl6pPr>
-            <a:lvl7pPr marL="2743200" algn="l" defTabSz="914400" rtl="0" eaLnBrk="1" latinLnBrk="0" hangingPunct="1">
-              <a:defRPr sz="1800" kern="1200">
-                <a:solidFill>
-                  <a:schemeClr val="tx1"/>
-                </a:solidFill>
-                <a:latin typeface="+mn-lt"/>
-                <a:ea typeface="+mn-ea"/>
-                <a:cs typeface="+mn-cs"/>
-              </a:defRPr>
-            </a:lvl7pPr>
-            <a:lvl8pPr marL="3200400" algn="l" defTabSz="914400" rtl="0" eaLnBrk="1" latinLnBrk="0" hangingPunct="1">
-              <a:defRPr sz="1800" kern="1200">
-                <a:solidFill>
-                  <a:schemeClr val="tx1"/>
-                </a:solidFill>
-                <a:latin typeface="+mn-lt"/>
-                <a:ea typeface="+mn-ea"/>
-                <a:cs typeface="+mn-cs"/>
-              </a:defRPr>
-            </a:lvl8pPr>
-            <a:lvl9pPr marL="3657600" algn="l" defTabSz="914400" rtl="0" eaLnBrk="1" latinLnBrk="0" hangingPunct="1">
-              <a:defRPr sz="1800" kern="1200">
-                <a:solidFill>
-                  <a:schemeClr val="tx1"/>
-                </a:solidFill>
-                <a:latin typeface="+mn-lt"/>
-                <a:ea typeface="+mn-ea"/>
-                <a:cs typeface="+mn-cs"/>
-              </a:defRPr>
-            </a:lvl9pPr>
-          </a:lstStyle>
-          <a:p>
-            <a:pPr algn="ctr">
-              <a:lnSpc>
-                <a:spcPct val="100000"/>
-              </a:lnSpc>
-            </a:pPr>
-            <a:r>
-              <a:rPr lang="en-US" sz="1200" dirty="0">
-                <a:solidFill>
-                  <a:srgbClr val="000000"/>
-                </a:solidFill>
-                <a:latin typeface="Verdana"/>
-                <a:ea typeface="Verdana"/>
-              </a:rPr>
-              <a:t>This project is funded through European Commission COSMOS Grant EC312941</a:t>
-            </a:r>
-            <a:endParaRPr dirty="0"/>
-          </a:p>
-        </p:txBody>
-      </p:sp>
-      <p:pic>
-        <p:nvPicPr>
-          <p:cNvPr id="39" name="Grafik 38"/>
-          <p:cNvPicPr>
-            <a:picLocks noChangeAspect="1"/>
-          </p:cNvPicPr>
-          <p:nvPr/>
-        </p:nvPicPr>
-        <p:blipFill>
-          <a:blip r:embed="rId30">
-            <a:extLst>
-              <a:ext uri="{28A0092B-C50C-407E-A947-70E740481C1C}">
-                <a14:useLocalDpi xmlns:a14="http://schemas.microsoft.com/office/drawing/2010/main" val="0"/>
-              </a:ext>
-            </a:extLst>
-          </a:blip>
-          <a:stretch>
-            <a:fillRect/>
-          </a:stretch>
-        </p:blipFill>
-        <p:spPr>
-          <a:xfrm>
-            <a:off x="27360305" y="1803011"/>
-            <a:ext cx="2213992" cy="2040004"/>
-          </a:xfrm>
-          <a:prstGeom prst="rect">
-            <a:avLst/>
-          </a:prstGeom>
-        </p:spPr>
-      </p:pic>
-      <p:pic>
-        <p:nvPicPr>
-          <p:cNvPr id="8" name="Grafik 7"/>
-          <p:cNvPicPr>
-            <a:picLocks noChangeAspect="1"/>
-          </p:cNvPicPr>
-          <p:nvPr/>
-        </p:nvPicPr>
-        <p:blipFill>
-          <a:blip r:embed="rId31">
-            <a:extLst>
-              <a:ext uri="{28A0092B-C50C-407E-A947-70E740481C1C}">
-                <a14:useLocalDpi xmlns:a14="http://schemas.microsoft.com/office/drawing/2010/main" val="0"/>
-              </a:ext>
-            </a:extLst>
-          </a:blip>
-          <a:stretch>
-            <a:fillRect/>
-          </a:stretch>
-        </p:blipFill>
-        <p:spPr>
-          <a:xfrm>
-            <a:off x="25162827" y="478750"/>
-            <a:ext cx="4619625" cy="1228725"/>
-          </a:xfrm>
-          <a:prstGeom prst="rect">
-            <a:avLst/>
-          </a:prstGeom>
-        </p:spPr>
-      </p:pic>
+        <p:style>
+          <a:lnRef idx="1">
+            <a:schemeClr val="accent5"/>
+          </a:lnRef>
+          <a:fillRef idx="3">
+            <a:schemeClr val="accent5"/>
+          </a:fillRef>
+          <a:effectRef idx="2">
+            <a:schemeClr val="accent5"/>
+          </a:effectRef>
+          <a:fontRef idx="minor">
+            <a:schemeClr val="lt1"/>
+          </a:fontRef>
+        </p:style>
+        <p:txBody>
+          <a:bodyPr rtlCol="0" anchor="ctr"/>
+          <a:lstStyle/>
+          <a:p>
+            <a:pPr algn="ctr"/>
+            <a:endParaRPr lang="en-US"/>
+          </a:p>
+        </p:txBody>
+      </p:sp>
     </p:spTree>
     <p:extLst>
       <p:ext uri="{BB962C8B-B14F-4D97-AF65-F5344CB8AC3E}">

</xml_diff>

<commit_message>
added collaboration invitation sentence to outlook
</commit_message>
<xml_diff>
--- a/docs/SchemaDocumentation/nmrML_Poster_124_Schober.pptx
+++ b/docs/SchemaDocumentation/nmrML_Poster_124_Schober.pptx
@@ -402,7 +402,7 @@
             <a:fld id="{220332FB-83C8-E24C-BAB1-A588F05ACF5F}" type="datetimeFigureOut">
               <a:rPr lang="en-US" smtClean="0"/>
               <a:pPr/>
-              <a:t>6/16/2014</a:t>
+              <a:t>6/17/2014</a:t>
             </a:fld>
             <a:endParaRPr lang="en-US"/>
           </a:p>
@@ -574,7 +574,7 @@
             <a:fld id="{220332FB-83C8-E24C-BAB1-A588F05ACF5F}" type="datetimeFigureOut">
               <a:rPr lang="en-US" smtClean="0"/>
               <a:pPr/>
-              <a:t>6/16/2014</a:t>
+              <a:t>6/17/2014</a:t>
             </a:fld>
             <a:endParaRPr lang="en-US"/>
           </a:p>
@@ -756,7 +756,7 @@
             <a:fld id="{220332FB-83C8-E24C-BAB1-A588F05ACF5F}" type="datetimeFigureOut">
               <a:rPr lang="en-US" smtClean="0"/>
               <a:pPr/>
-              <a:t>6/16/2014</a:t>
+              <a:t>6/17/2014</a:t>
             </a:fld>
             <a:endParaRPr lang="en-US"/>
           </a:p>
@@ -928,7 +928,7 @@
             <a:fld id="{220332FB-83C8-E24C-BAB1-A588F05ACF5F}" type="datetimeFigureOut">
               <a:rPr lang="en-US" smtClean="0"/>
               <a:pPr/>
-              <a:t>6/16/2014</a:t>
+              <a:t>6/17/2014</a:t>
             </a:fld>
             <a:endParaRPr lang="en-US"/>
           </a:p>
@@ -1176,7 +1176,7 @@
             <a:fld id="{220332FB-83C8-E24C-BAB1-A588F05ACF5F}" type="datetimeFigureOut">
               <a:rPr lang="en-US" smtClean="0"/>
               <a:pPr/>
-              <a:t>6/16/2014</a:t>
+              <a:t>6/17/2014</a:t>
             </a:fld>
             <a:endParaRPr lang="en-US"/>
           </a:p>
@@ -1466,7 +1466,7 @@
             <a:fld id="{220332FB-83C8-E24C-BAB1-A588F05ACF5F}" type="datetimeFigureOut">
               <a:rPr lang="en-US" smtClean="0"/>
               <a:pPr/>
-              <a:t>6/16/2014</a:t>
+              <a:t>6/17/2014</a:t>
             </a:fld>
             <a:endParaRPr lang="en-US"/>
           </a:p>
@@ -1895,7 +1895,7 @@
             <a:fld id="{220332FB-83C8-E24C-BAB1-A588F05ACF5F}" type="datetimeFigureOut">
               <a:rPr lang="en-US" smtClean="0"/>
               <a:pPr/>
-              <a:t>6/16/2014</a:t>
+              <a:t>6/17/2014</a:t>
             </a:fld>
             <a:endParaRPr lang="en-US"/>
           </a:p>
@@ -2015,7 +2015,7 @@
             <a:fld id="{220332FB-83C8-E24C-BAB1-A588F05ACF5F}" type="datetimeFigureOut">
               <a:rPr lang="en-US" smtClean="0"/>
               <a:pPr/>
-              <a:t>6/16/2014</a:t>
+              <a:t>6/17/2014</a:t>
             </a:fld>
             <a:endParaRPr lang="en-US"/>
           </a:p>
@@ -2112,7 +2112,7 @@
             <a:fld id="{220332FB-83C8-E24C-BAB1-A588F05ACF5F}" type="datetimeFigureOut">
               <a:rPr lang="en-US" smtClean="0"/>
               <a:pPr/>
-              <a:t>6/16/2014</a:t>
+              <a:t>6/17/2014</a:t>
             </a:fld>
             <a:endParaRPr lang="en-US"/>
           </a:p>
@@ -2391,7 +2391,7 @@
             <a:fld id="{220332FB-83C8-E24C-BAB1-A588F05ACF5F}" type="datetimeFigureOut">
               <a:rPr lang="en-US" smtClean="0"/>
               <a:pPr/>
-              <a:t>6/16/2014</a:t>
+              <a:t>6/17/2014</a:t>
             </a:fld>
             <a:endParaRPr lang="en-US"/>
           </a:p>
@@ -2646,7 +2646,7 @@
             <a:fld id="{220332FB-83C8-E24C-BAB1-A588F05ACF5F}" type="datetimeFigureOut">
               <a:rPr lang="en-US" smtClean="0"/>
               <a:pPr/>
-              <a:t>6/16/2014</a:t>
+              <a:t>6/17/2014</a:t>
             </a:fld>
             <a:endParaRPr lang="en-US"/>
           </a:p>
@@ -2861,7 +2861,7 @@
             <a:fld id="{220332FB-83C8-E24C-BAB1-A588F05ACF5F}" type="datetimeFigureOut">
               <a:rPr lang="en-US" smtClean="0"/>
               <a:pPr/>
-              <a:t>6/16/2014</a:t>
+              <a:t>6/17/2014</a:t>
             </a:fld>
             <a:endParaRPr lang="en-US"/>
           </a:p>
@@ -3342,7 +3342,7 @@
         <p:spPr>
           <a:xfrm>
             <a:off x="829481" y="29605662"/>
-            <a:ext cx="28492309" cy="5946497"/>
+            <a:ext cx="28683880" cy="5946497"/>
           </a:xfrm>
           <a:prstGeom prst="rect">
             <a:avLst/>
@@ -3383,7 +3383,7 @@
         <p:spPr>
           <a:xfrm>
             <a:off x="19993374" y="21643044"/>
-            <a:ext cx="9213637" cy="4621720"/>
+            <a:ext cx="9519987" cy="4621720"/>
           </a:xfrm>
           <a:prstGeom prst="rect">
             <a:avLst/>
@@ -3840,17 +3840,7 @@
                 <a:latin typeface="Verdana"/>
                 <a:cs typeface="Verdana"/>
               </a:rPr>
-              <a:t>age </a:t>
-            </a:r>
-            <a:r>
-              <a:rPr lang="en-US" sz="2800" dirty="0" smtClean="0">
-                <a:solidFill>
-                  <a:srgbClr val="121421"/>
-                </a:solidFill>
-                <a:latin typeface="Verdana"/>
-                <a:cs typeface="Verdana"/>
-              </a:rPr>
-              <a:t>fast, posing </a:t>
+              <a:t>age fast, posing </a:t>
             </a:r>
             <a:r>
               <a:rPr lang="en-US" sz="2800" dirty="0">
@@ -4137,17 +4127,17 @@
                 <a:latin typeface="Verdana"/>
                 <a:cs typeface="Verdana"/>
               </a:rPr>
-              <a:t> and Agilent/Varian data </a:t>
-            </a:r>
-            <a:r>
-              <a:rPr lang="en-US" sz="2800" dirty="0">
+              <a:t> </a:t>
+            </a:r>
+            <a:r>
+              <a:rPr lang="en-US" sz="2800" dirty="0" smtClean="0">
                 <a:solidFill>
                   <a:srgbClr val="121421"/>
                 </a:solidFill>
                 <a:latin typeface="Verdana"/>
                 <a:cs typeface="Verdana"/>
               </a:rPr>
-              <a:t>formats, which can be </a:t>
+              <a:t>&amp; </a:t>
             </a:r>
             <a:r>
               <a:rPr lang="en-US" sz="2800" dirty="0" smtClean="0">
@@ -4157,7 +4147,7 @@
                 <a:latin typeface="Verdana"/>
                 <a:cs typeface="Verdana"/>
               </a:rPr>
-              <a:t>incorporated into open </a:t>
+              <a:t>Agilent/Varian data </a:t>
             </a:r>
             <a:r>
               <a:rPr lang="en-US" sz="2800" dirty="0">
@@ -4167,7 +4157,37 @@
                 <a:latin typeface="Verdana"/>
                 <a:cs typeface="Verdana"/>
               </a:rPr>
-              <a:t>NMR processing and analysis software. </a:t>
+              <a:t>formats, which can be </a:t>
+            </a:r>
+            <a:r>
+              <a:rPr lang="en-US" sz="2800" dirty="0" smtClean="0">
+                <a:solidFill>
+                  <a:srgbClr val="121421"/>
+                </a:solidFill>
+                <a:latin typeface="Verdana"/>
+                <a:cs typeface="Verdana"/>
+              </a:rPr>
+              <a:t>incorporated into open </a:t>
+            </a:r>
+            <a:r>
+              <a:rPr lang="en-US" sz="2800" dirty="0">
+                <a:solidFill>
+                  <a:srgbClr val="121421"/>
+                </a:solidFill>
+                <a:latin typeface="Verdana"/>
+                <a:cs typeface="Verdana"/>
+              </a:rPr>
+              <a:t>NMR processing and analysis software</a:t>
+            </a:r>
+            <a:r>
+              <a:rPr lang="en-US" sz="2800" dirty="0" smtClean="0">
+                <a:solidFill>
+                  <a:srgbClr val="121421"/>
+                </a:solidFill>
+                <a:latin typeface="Verdana"/>
+                <a:cs typeface="Verdana"/>
+              </a:rPr>
+              <a:t>.</a:t>
             </a:r>
             <a:endParaRPr lang="ro-RO" sz="2800" dirty="0">
               <a:solidFill>
@@ -4231,8 +4251,8 @@
         </p:nvSpPr>
         <p:spPr>
           <a:xfrm>
-            <a:off x="754043" y="37071212"/>
-            <a:ext cx="19515998" cy="1514261"/>
+            <a:off x="754042" y="37071212"/>
+            <a:ext cx="20750403" cy="1988237"/>
           </a:xfrm>
           <a:prstGeom prst="rect">
             <a:avLst/>
@@ -4338,87 +4358,77 @@
                 <a:latin typeface="Verdana"/>
                 <a:cs typeface="Verdana"/>
               </a:rPr>
-              <a:t>C</a:t>
-            </a:r>
-            <a:r>
-              <a:rPr lang="en-US" sz="2800" dirty="0" smtClean="0">
+              <a:t>Coverage </a:t>
+            </a:r>
+            <a:r>
+              <a:rPr lang="en-US" sz="2800" dirty="0">
                 <a:solidFill>
                   <a:srgbClr val="121421"/>
                 </a:solidFill>
                 <a:latin typeface="Verdana"/>
                 <a:cs typeface="Verdana"/>
               </a:rPr>
-              <a:t>overage </a:t>
-            </a:r>
-            <a:r>
-              <a:rPr lang="en-US" sz="2800" dirty="0">
+              <a:t>is </a:t>
+            </a:r>
+            <a:r>
+              <a:rPr lang="en-US" sz="2800" dirty="0" smtClean="0">
                 <a:solidFill>
                   <a:srgbClr val="121421"/>
                 </a:solidFill>
                 <a:latin typeface="Verdana"/>
                 <a:cs typeface="Verdana"/>
               </a:rPr>
-              <a:t>is </a:t>
-            </a:r>
-            <a:r>
-              <a:rPr lang="en-US" sz="2800" dirty="0" smtClean="0">
+              <a:t>already good </a:t>
+            </a:r>
+            <a:r>
+              <a:rPr lang="en-US" sz="2800" dirty="0">
                 <a:solidFill>
                   <a:srgbClr val="121421"/>
                 </a:solidFill>
                 <a:latin typeface="Verdana"/>
                 <a:cs typeface="Verdana"/>
               </a:rPr>
-              <a:t>already good </a:t>
-            </a:r>
-            <a:r>
-              <a:rPr lang="en-US" sz="2800" dirty="0">
+              <a:t>at raw data capture, </a:t>
+            </a:r>
+            <a:r>
+              <a:rPr lang="en-US" sz="2800" dirty="0" smtClean="0">
                 <a:solidFill>
                   <a:srgbClr val="121421"/>
                 </a:solidFill>
                 <a:latin typeface="Verdana"/>
                 <a:cs typeface="Verdana"/>
               </a:rPr>
-              <a:t>at raw data capture, </a:t>
-            </a:r>
-            <a:r>
-              <a:rPr lang="en-US" sz="2800" dirty="0" smtClean="0">
+              <a:t>yet the </a:t>
+            </a:r>
+            <a:r>
+              <a:rPr lang="en-US" sz="2800" dirty="0">
                 <a:solidFill>
                   <a:srgbClr val="121421"/>
                 </a:solidFill>
                 <a:latin typeface="Verdana"/>
                 <a:cs typeface="Verdana"/>
               </a:rPr>
-              <a:t>yet the </a:t>
-            </a:r>
-            <a:r>
-              <a:rPr lang="en-US" sz="2800" dirty="0">
-                <a:solidFill>
-                  <a:srgbClr val="121421"/>
+              <a:t>XSD and CV will be </a:t>
+            </a:r>
+            <a:r>
+              <a:rPr lang="en-US" sz="2800" b="1" dirty="0">
+                <a:solidFill>
+                  <a:schemeClr val="accent1"/>
                 </a:solidFill>
                 <a:latin typeface="Verdana"/>
                 <a:cs typeface="Verdana"/>
               </a:rPr>
-              <a:t>XSD and CV will be </a:t>
-            </a:r>
-            <a:r>
-              <a:rPr lang="en-US" sz="2800" b="1" dirty="0">
-                <a:solidFill>
-                  <a:schemeClr val="accent1"/>
+              <a:t>expanded for better processed data &amp; quantification data handling</a:t>
+            </a:r>
+            <a:r>
+              <a:rPr lang="en-US" sz="2800" dirty="0" smtClean="0">
+                <a:solidFill>
+                  <a:srgbClr val="121421"/>
                 </a:solidFill>
                 <a:latin typeface="Verdana"/>
                 <a:cs typeface="Verdana"/>
               </a:rPr>
-              <a:t>expanded for better processed data &amp; quantification data handling</a:t>
-            </a:r>
-            <a:r>
-              <a:rPr lang="en-US" sz="2800" dirty="0">
-                <a:solidFill>
-                  <a:srgbClr val="121421"/>
-                </a:solidFill>
-                <a:latin typeface="Verdana"/>
-                <a:cs typeface="Verdana"/>
-              </a:rPr>
-              <a:t>. </a:t>
+              <a:t>. We encourage potential users and the open source community to evaluate our resource and invite you for collaboration.</a:t>
             </a:r>
             <a:endParaRPr lang="en-US" sz="2800" dirty="0">
               <a:solidFill>
@@ -4488,8 +4498,8 @@
         </p:blipFill>
         <p:spPr>
           <a:xfrm>
-            <a:off x="28510339" y="40154076"/>
-            <a:ext cx="1003022" cy="1264821"/>
+            <a:off x="28595578" y="40100622"/>
+            <a:ext cx="802976" cy="1012561"/>
           </a:xfrm>
           <a:prstGeom prst="rect">
             <a:avLst/>
@@ -5493,18 +5503,7 @@
                 <a:ea typeface="Verdana" pitchFamily="34" charset="0"/>
                 <a:cs typeface="Verdana" pitchFamily="34" charset="0"/>
               </a:rPr>
-              <a:t>nmrML</a:t>
-            </a:r>
-            <a:r>
-              <a:rPr lang="de-DE" sz="3600" b="1" dirty="0" smtClean="0">
-                <a:solidFill>
-                  <a:srgbClr val="2F3246"/>
-                </a:solidFill>
-                <a:latin typeface="Verdana" pitchFamily="34" charset="0"/>
-                <a:ea typeface="Verdana" pitchFamily="34" charset="0"/>
-                <a:cs typeface="Verdana" pitchFamily="34" charset="0"/>
-              </a:rPr>
-              <a:t>.xsd</a:t>
+              <a:t>nmrML.xsd</a:t>
             </a:r>
             <a:endParaRPr lang="en-US" sz="3600" b="1" dirty="0">
               <a:solidFill>
@@ -5704,7 +5703,7 @@
         </p:blipFill>
         <p:spPr>
           <a:xfrm>
-            <a:off x="21712349" y="40429492"/>
+            <a:off x="21447899" y="40757192"/>
             <a:ext cx="2379305" cy="852288"/>
           </a:xfrm>
           <a:prstGeom prst="rect">
@@ -5721,7 +5720,7 @@
         <p:spPr>
           <a:xfrm>
             <a:off x="754043" y="9059686"/>
-            <a:ext cx="18473546" cy="3410164"/>
+            <a:ext cx="18859636" cy="3410164"/>
           </a:xfrm>
           <a:prstGeom prst="rect">
             <a:avLst/>
@@ -5923,67 +5922,67 @@
                 <a:latin typeface="Verdana"/>
                 <a:cs typeface="Verdana"/>
               </a:rPr>
-              <a:t>to </a:t>
-            </a:r>
-            <a:r>
-              <a:rPr lang="en-US" sz="2800" dirty="0" smtClean="0">
-                <a:solidFill>
-                  <a:srgbClr val="121421"/>
+              <a:t>to create an </a:t>
+            </a:r>
+            <a:r>
+              <a:rPr lang="en-US" sz="2800" b="1" dirty="0" smtClean="0">
+                <a:solidFill>
+                  <a:schemeClr val="accent1"/>
                 </a:solidFill>
                 <a:latin typeface="Verdana"/>
                 <a:cs typeface="Verdana"/>
               </a:rPr>
-              <a:t>create an </a:t>
-            </a:r>
-            <a:r>
-              <a:rPr lang="en-US" sz="2800" b="1" dirty="0" smtClean="0">
-                <a:solidFill>
-                  <a:schemeClr val="accent1"/>
+              <a:t>open exchange and storage format for NMR data</a:t>
+            </a:r>
+            <a:r>
+              <a:rPr lang="en-US" sz="2800" dirty="0" smtClean="0">
+                <a:solidFill>
+                  <a:srgbClr val="121421"/>
                 </a:solidFill>
                 <a:latin typeface="Verdana"/>
                 <a:cs typeface="Verdana"/>
               </a:rPr>
-              <a:t>open exchange and storage format for NMR data</a:t>
-            </a:r>
-            <a:r>
-              <a:rPr lang="en-US" sz="2800" dirty="0" smtClean="0">
+              <a:t>. We largely follow design principles already established in the Proteomics Standards Initiative (PSI) for the </a:t>
+            </a:r>
+            <a:r>
+              <a:rPr lang="en-US" sz="2800" dirty="0" err="1" smtClean="0">
                 <a:solidFill>
                   <a:srgbClr val="121421"/>
                 </a:solidFill>
                 <a:latin typeface="Verdana"/>
                 <a:cs typeface="Verdana"/>
               </a:rPr>
-              <a:t>. We largely follow design principles already established in the Proteomics Standards Initiative (PSI) for the </a:t>
-            </a:r>
-            <a:r>
-              <a:rPr lang="en-US" sz="2800" dirty="0" err="1" smtClean="0">
+              <a:t>mzML</a:t>
+            </a:r>
+            <a:r>
+              <a:rPr lang="en-US" sz="2800" dirty="0" smtClean="0">
                 <a:solidFill>
                   <a:srgbClr val="121421"/>
                 </a:solidFill>
                 <a:latin typeface="Verdana"/>
                 <a:cs typeface="Verdana"/>
               </a:rPr>
-              <a:t>mzML</a:t>
-            </a:r>
-            <a:r>
-              <a:rPr lang="en-US" sz="2800" dirty="0" smtClean="0">
-                <a:solidFill>
-                  <a:srgbClr val="121421"/>
+              <a:t> data standard for mass spectrometry. The standard is composed of an </a:t>
+            </a:r>
+            <a:r>
+              <a:rPr lang="en-US" sz="2800" b="1" dirty="0" smtClean="0">
+                <a:solidFill>
+                  <a:schemeClr val="accent1"/>
                 </a:solidFill>
                 <a:latin typeface="Verdana"/>
                 <a:cs typeface="Verdana"/>
               </a:rPr>
-              <a:t> data standard for mass spectrometry. The standard is composed of an </a:t>
-            </a:r>
-            <a:r>
-              <a:rPr lang="en-US" sz="2800" b="1" dirty="0" smtClean="0">
-                <a:solidFill>
-                  <a:schemeClr val="accent1"/>
+              <a:t>XML schema definition</a:t>
+            </a:r>
+            <a:r>
+              <a:rPr lang="en-US" sz="2800" dirty="0" smtClean="0">
+                <a:solidFill>
+                  <a:srgbClr val="121421"/>
                 </a:solidFill>
                 <a:latin typeface="Verdana"/>
                 <a:cs typeface="Verdana"/>
               </a:rPr>
-              <a:t>XML </a:t>
+              <a:t> (nmrML.xsd) and an accompanying </a:t>
             </a:r>
             <a:r>
               <a:rPr lang="en-US" sz="2800" b="1" dirty="0" smtClean="0">
@@ -5993,7 +5992,7 @@
                 <a:latin typeface="Verdana"/>
                 <a:cs typeface="Verdana"/>
               </a:rPr>
-              <a:t>schema definition</a:t>
+              <a:t>controlled vocabulary</a:t>
             </a:r>
             <a:r>
               <a:rPr lang="en-US" sz="2800" dirty="0" smtClean="0">
@@ -6003,117 +6002,47 @@
                 <a:latin typeface="Verdana"/>
                 <a:cs typeface="Verdana"/>
               </a:rPr>
-              <a:t> (nmrML.xsd</a:t>
-            </a:r>
-            <a:r>
-              <a:rPr lang="en-US" sz="2800" dirty="0" smtClean="0">
+              <a:t> (</a:t>
+            </a:r>
+            <a:r>
+              <a:rPr lang="en-US" sz="2800" dirty="0" err="1" smtClean="0">
                 <a:solidFill>
                   <a:srgbClr val="121421"/>
                 </a:solidFill>
                 <a:latin typeface="Verdana"/>
                 <a:cs typeface="Verdana"/>
               </a:rPr>
-              <a:t>) and an accompanying </a:t>
-            </a:r>
-            <a:r>
-              <a:rPr lang="en-US" sz="2800" b="1" dirty="0" smtClean="0">
-                <a:solidFill>
-                  <a:schemeClr val="accent1"/>
+              <a:t>nmrCV.owl</a:t>
+            </a:r>
+            <a:r>
+              <a:rPr lang="en-US" sz="2800" dirty="0" smtClean="0">
+                <a:solidFill>
+                  <a:srgbClr val="121421"/>
                 </a:solidFill>
                 <a:latin typeface="Verdana"/>
                 <a:cs typeface="Verdana"/>
               </a:rPr>
-              <a:t>controlled vocabulary</a:t>
-            </a:r>
-            <a:r>
-              <a:rPr lang="en-US" sz="2800" dirty="0" smtClean="0">
+              <a:t>), which ensures update flexibility and schema robustness by allowing to outsource more variant and dynamic descriptors into the vocabulary, which is referenced from within an </a:t>
+            </a:r>
+            <a:r>
+              <a:rPr lang="en-US" sz="2800" dirty="0" err="1" smtClean="0">
                 <a:solidFill>
                   <a:srgbClr val="121421"/>
                 </a:solidFill>
                 <a:latin typeface="Verdana"/>
                 <a:cs typeface="Verdana"/>
               </a:rPr>
-              <a:t> (</a:t>
-            </a:r>
-            <a:r>
-              <a:rPr lang="en-US" sz="2800" dirty="0" err="1" smtClean="0">
+              <a:t>nmrML</a:t>
+            </a:r>
+            <a:r>
+              <a:rPr lang="en-US" sz="2800" dirty="0" smtClean="0">
                 <a:solidFill>
                   <a:srgbClr val="121421"/>
                 </a:solidFill>
                 <a:latin typeface="Verdana"/>
                 <a:cs typeface="Verdana"/>
               </a:rPr>
-              <a:t>nmrCV.owl</a:t>
-            </a:r>
-            <a:r>
-              <a:rPr lang="en-US" sz="2800" dirty="0" smtClean="0">
-                <a:solidFill>
-                  <a:srgbClr val="121421"/>
-                </a:solidFill>
-                <a:latin typeface="Verdana"/>
-                <a:cs typeface="Verdana"/>
-              </a:rPr>
-              <a:t>), which ensures update flexibility and schema robustness by allowing to outsource more variant and dynamic descriptors into the </a:t>
-            </a:r>
-            <a:r>
-              <a:rPr lang="en-US" sz="2800" dirty="0" smtClean="0">
-                <a:solidFill>
-                  <a:srgbClr val="121421"/>
-                </a:solidFill>
-                <a:latin typeface="Verdana"/>
-                <a:cs typeface="Verdana"/>
-              </a:rPr>
-              <a:t>vocabulary, </a:t>
-            </a:r>
-            <a:r>
-              <a:rPr lang="en-US" sz="2800" dirty="0" smtClean="0">
-                <a:solidFill>
-                  <a:srgbClr val="121421"/>
-                </a:solidFill>
-                <a:latin typeface="Verdana"/>
-                <a:cs typeface="Verdana"/>
-              </a:rPr>
-              <a:t>which is referenced from within an </a:t>
-            </a:r>
-            <a:r>
-              <a:rPr lang="en-US" sz="2800" dirty="0" err="1" smtClean="0">
-                <a:solidFill>
-                  <a:srgbClr val="121421"/>
-                </a:solidFill>
-                <a:latin typeface="Verdana"/>
-                <a:cs typeface="Verdana"/>
-              </a:rPr>
-              <a:t>nmrML</a:t>
-            </a:r>
-            <a:r>
-              <a:rPr lang="en-US" sz="2800" dirty="0" smtClean="0">
-                <a:solidFill>
-                  <a:srgbClr val="121421"/>
-                </a:solidFill>
-                <a:latin typeface="Verdana"/>
-                <a:cs typeface="Verdana"/>
-              </a:rPr>
-              <a:t> </a:t>
-            </a:r>
-            <a:r>
-              <a:rPr lang="en-US" sz="2800" dirty="0" smtClean="0">
-                <a:solidFill>
-                  <a:srgbClr val="121421"/>
-                </a:solidFill>
-                <a:latin typeface="Verdana"/>
-                <a:cs typeface="Verdana"/>
-              </a:rPr>
-              <a:t>data file</a:t>
-            </a:r>
-            <a:r>
-              <a:rPr lang="en-US" sz="2800" dirty="0" smtClean="0">
-                <a:solidFill>
-                  <a:srgbClr val="121421"/>
-                </a:solidFill>
-                <a:latin typeface="Verdana"/>
-                <a:cs typeface="Verdana"/>
-              </a:rPr>
-              <a:t>.</a:t>
+              <a:t> data file.</a:t>
             </a:r>
             <a:endParaRPr lang="ro-RO" sz="2800" dirty="0">
               <a:solidFill>
@@ -6133,8 +6062,8 @@
         </p:nvSpPr>
         <p:spPr>
           <a:xfrm>
-            <a:off x="21054075" y="37011841"/>
-            <a:ext cx="8600124" cy="2169825"/>
+            <a:off x="21903134" y="37011841"/>
+            <a:ext cx="7613692" cy="2169825"/>
           </a:xfrm>
           <a:prstGeom prst="rect">
             <a:avLst/>
@@ -6536,11 +6465,7 @@
           <a:p>
             <a:r>
               <a:rPr lang="en-US" sz="1400" dirty="0" smtClean="0"/>
-              <a:t>Data excerpt  </a:t>
-            </a:r>
-            <a:r>
-              <a:rPr lang="en-US" sz="1400" dirty="0" smtClean="0"/>
-              <a:t>from a paper: </a:t>
+              <a:t>Data excerpt  from a paper: </a:t>
             </a:r>
             <a:r>
               <a:rPr lang="en-US" sz="1400" i="1" dirty="0" err="1" smtClean="0"/>
@@ -6723,20 +6648,20 @@
           <p:nvPr>
             <p:extLst>
               <p:ext uri="{D42A27DB-BD31-4B8C-83A1-F6EECF244321}">
-                <p14:modId xmlns:p14="http://schemas.microsoft.com/office/powerpoint/2010/main" val="4061155149"/>
+                <p14:modId xmlns:p14="http://schemas.microsoft.com/office/powerpoint/2010/main" val="226219351"/>
               </p:ext>
             </p:extLst>
           </p:nvPr>
         </p:nvGraphicFramePr>
         <p:xfrm>
-          <a:off x="26396039" y="40389399"/>
-          <a:ext cx="1609725" cy="781050"/>
+          <a:off x="26251292" y="41113183"/>
+          <a:ext cx="1390818" cy="674835"/>
         </p:xfrm>
         <a:graphic>
           <a:graphicData uri="http://schemas.openxmlformats.org/presentationml/2006/ole">
             <mc:AlternateContent xmlns:mc="http://schemas.openxmlformats.org/markup-compatibility/2006">
               <mc:Choice xmlns:v="urn:schemas-microsoft-com:vml" Requires="v">
-                <p:oleObj spid="_x0000_s3196" r:id="rId15" imgW="155999880" imgH="75692160" progId="">
+                <p:oleObj spid="_x0000_s3205" r:id="rId15" imgW="155999880" imgH="75692160" progId="">
                   <p:embed/>
                 </p:oleObj>
               </mc:Choice>
@@ -6757,8 +6682,8 @@
                     </p:blipFill>
                     <p:spPr>
                       <a:xfrm>
-                        <a:off x="26396039" y="40389399"/>
-                        <a:ext cx="1609725" cy="781050"/>
+                        <a:off x="26251292" y="41113183"/>
+                        <a:ext cx="1390818" cy="674835"/>
                       </a:xfrm>
                       <a:prstGeom prst="rect">
                         <a:avLst/>
@@ -6794,7 +6719,7 @@
         </p:blipFill>
         <p:spPr bwMode="auto">
           <a:xfrm>
-            <a:off x="24432274" y="40556274"/>
+            <a:off x="24017350" y="40473011"/>
             <a:ext cx="1461107" cy="857238"/>
           </a:xfrm>
           <a:prstGeom prst="rect">
@@ -6820,7 +6745,7 @@
         </p:nvSpPr>
         <p:spPr>
           <a:xfrm>
-            <a:off x="25039428" y="41266599"/>
+            <a:off x="24624504" y="41183336"/>
             <a:ext cx="1258134" cy="307777"/>
           </a:xfrm>
           <a:prstGeom prst="rect">
@@ -6864,7 +6789,7 @@
         </p:blipFill>
         <p:spPr bwMode="auto">
           <a:xfrm>
-            <a:off x="26396039" y="41472741"/>
+            <a:off x="25745870" y="40499067"/>
             <a:ext cx="2464302" cy="284561"/>
           </a:xfrm>
           <a:prstGeom prst="rect">
@@ -7014,17 +6939,17 @@
                 <a:latin typeface="Verdana"/>
                 <a:cs typeface="Verdana"/>
               </a:rPr>
-              <a:t> which checks the quality of NMR data files in a multilayered approach, i.e. ensuring the data is syntactically well formatted, adheres to the </a:t>
-            </a:r>
-            <a:r>
-              <a:rPr lang="en-US" sz="2800" dirty="0" smtClean="0">
+              <a:t> </a:t>
+            </a:r>
+            <a:r>
+              <a:rPr lang="en-US" sz="2800" dirty="0" err="1" smtClean="0">
                 <a:solidFill>
                   <a:srgbClr val="121421"/>
                 </a:solidFill>
                 <a:latin typeface="Verdana"/>
                 <a:cs typeface="Verdana"/>
               </a:rPr>
-              <a:t>nmrML.xsd, </a:t>
+              <a:t>webservice</a:t>
             </a:r>
             <a:r>
               <a:rPr lang="en-US" sz="2800" dirty="0" smtClean="0">
@@ -7034,17 +6959,17 @@
                 <a:latin typeface="Verdana"/>
                 <a:cs typeface="Verdana"/>
               </a:rPr>
-              <a:t>and is sufficiently detailed with respect to data content and CV annotations. Semantic validation exploits rules that set constraints </a:t>
-            </a:r>
-            <a:r>
-              <a:rPr lang="en-US" sz="2800" dirty="0">
+              <a:t>, which </a:t>
+            </a:r>
+            <a:r>
+              <a:rPr lang="en-US" sz="2800" dirty="0" smtClean="0">
                 <a:solidFill>
                   <a:srgbClr val="121421"/>
                 </a:solidFill>
                 <a:latin typeface="Verdana"/>
                 <a:cs typeface="Verdana"/>
               </a:rPr>
-              <a:t>on certain XML </a:t>
+              <a:t>checks the quality of </a:t>
             </a:r>
             <a:r>
               <a:rPr lang="en-US" sz="2800" dirty="0" smtClean="0">
@@ -7054,7 +6979,7 @@
                 <a:latin typeface="Verdana"/>
                 <a:cs typeface="Verdana"/>
               </a:rPr>
-              <a:t>positions, </a:t>
+              <a:t>your NMR </a:t>
             </a:r>
             <a:r>
               <a:rPr lang="en-US" sz="2800" dirty="0" smtClean="0">
@@ -7064,17 +6989,17 @@
                 <a:latin typeface="Verdana"/>
                 <a:cs typeface="Verdana"/>
               </a:rPr>
-              <a:t>i.e. which CV terms are allowed at a certain XML location. Such checks can enforce aspects of </a:t>
-            </a:r>
-            <a:r>
-              <a:rPr lang="en-US" sz="2800" b="1" dirty="0" smtClean="0">
-                <a:solidFill>
-                  <a:srgbClr val="0070C0"/>
+              <a:t>data files in a multilayered approach, i.e. ensuring the data is syntactically well formatted, adheres to the nmrML.xsd, and is sufficiently detailed with respect to data content and CV annotations. Semantic validation exploits rules that set constraints </a:t>
+            </a:r>
+            <a:r>
+              <a:rPr lang="en-US" sz="2800" dirty="0">
+                <a:solidFill>
+                  <a:srgbClr val="121421"/>
                 </a:solidFill>
                 <a:latin typeface="Verdana"/>
                 <a:cs typeface="Verdana"/>
               </a:rPr>
-              <a:t>minimal information requirements</a:t>
+              <a:t>on certain XML </a:t>
             </a:r>
             <a:r>
               <a:rPr lang="en-US" sz="2800" dirty="0" smtClean="0">
@@ -7084,17 +7009,27 @@
                 <a:latin typeface="Verdana"/>
                 <a:cs typeface="Verdana"/>
               </a:rPr>
-              <a:t>, e.g. from the Core Information for Metabolomics Reporting (CIMR</a:t>
-            </a:r>
-            <a:r>
-              <a:rPr lang="en-US" sz="2800" dirty="0" smtClean="0">
-                <a:solidFill>
-                  <a:srgbClr val="121421"/>
+              <a:t>positions, i.e. which CV terms are allowed at a certain XML location. Such checks can enforce aspects of </a:t>
+            </a:r>
+            <a:r>
+              <a:rPr lang="en-US" sz="2800" b="1" dirty="0" smtClean="0">
+                <a:solidFill>
+                  <a:srgbClr val="0070C0"/>
                 </a:solidFill>
                 <a:latin typeface="Verdana"/>
                 <a:cs typeface="Verdana"/>
               </a:rPr>
-              <a:t>) or given journal policies.</a:t>
+              <a:t>minimal information requirements</a:t>
+            </a:r>
+            <a:r>
+              <a:rPr lang="en-US" sz="2800" dirty="0" smtClean="0">
+                <a:solidFill>
+                  <a:srgbClr val="121421"/>
+                </a:solidFill>
+                <a:latin typeface="Verdana"/>
+                <a:cs typeface="Verdana"/>
+              </a:rPr>
+              <a:t>, e.g. from the Core Information for Metabolomics Reporting (CIMR) or given journal policies.</a:t>
             </a:r>
             <a:endParaRPr lang="ro-RO" sz="2800" dirty="0">
               <a:solidFill>
@@ -7246,7 +7181,7 @@
         </p:nvSpPr>
         <p:spPr>
           <a:xfrm>
-            <a:off x="20896402" y="36087530"/>
+            <a:off x="22357718" y="36087530"/>
             <a:ext cx="6283476" cy="646331"/>
           </a:xfrm>
           <a:prstGeom prst="rect">
@@ -7367,7 +7302,7 @@
         </p:nvSpPr>
         <p:spPr>
           <a:xfrm>
-            <a:off x="14931151" y="40512547"/>
+            <a:off x="14839634" y="40662325"/>
             <a:ext cx="6921036" cy="1061829"/>
           </a:xfrm>
           <a:prstGeom prst="rect">
@@ -7639,11 +7574,7 @@
           <a:p>
             <a:r>
               <a:rPr lang="de-DE" sz="2400" dirty="0" smtClean="0"/>
-              <a:t>The Validation </a:t>
-            </a:r>
-            <a:r>
-              <a:rPr lang="de-DE" sz="2400" dirty="0" smtClean="0"/>
-              <a:t>Layer </a:t>
+              <a:t>The Validation Layer </a:t>
             </a:r>
             <a:r>
               <a:rPr lang="de-DE" sz="2400" dirty="0" err="1" smtClean="0"/>
@@ -8970,7 +8901,7 @@
         </p:nvSpPr>
         <p:spPr>
           <a:xfrm>
-            <a:off x="26557425" y="16734192"/>
+            <a:off x="26498927" y="16734192"/>
             <a:ext cx="1774676" cy="276999"/>
           </a:xfrm>
           <a:prstGeom prst="rect">
@@ -9056,11 +8987,7 @@
           <a:p>
             <a:r>
               <a:rPr lang="en-US" sz="1050" dirty="0" smtClean="0"/>
-              <a:t>Decision </a:t>
-            </a:r>
-            <a:r>
-              <a:rPr lang="en-US" sz="1050" dirty="0" smtClean="0"/>
-              <a:t>support</a:t>
+              <a:t>Decision support</a:t>
             </a:r>
           </a:p>
           <a:p>
@@ -9079,9 +9006,9 @@
           <p:nvPr/>
         </p:nvSpPr>
         <p:spPr>
-          <a:xfrm rot="3273551">
-            <a:off x="23050620" y="15623338"/>
-            <a:ext cx="216640" cy="1241329"/>
+          <a:xfrm rot="3273551" flipV="1">
+            <a:off x="23018647" y="15388976"/>
+            <a:ext cx="241102" cy="1613668"/>
           </a:xfrm>
           <a:prstGeom prst="downArrow">
             <a:avLst/>
@@ -9340,7 +9267,7 @@
         </p:blipFill>
         <p:spPr>
           <a:xfrm>
-            <a:off x="27179878" y="17262854"/>
+            <a:off x="27439298" y="17262854"/>
             <a:ext cx="377783" cy="220652"/>
           </a:xfrm>
           <a:prstGeom prst="rect">
@@ -9777,7 +9704,7 @@
         <p:spPr>
           <a:xfrm>
             <a:off x="20595770" y="8877936"/>
-            <a:ext cx="8504597" cy="4125949"/>
+            <a:ext cx="8504597" cy="4314507"/>
           </a:xfrm>
           <a:prstGeom prst="roundRect">
             <a:avLst/>
@@ -9819,8 +9746,8 @@
         </p:nvSpPr>
         <p:spPr>
           <a:xfrm>
-            <a:off x="22956189" y="9834921"/>
-            <a:ext cx="1165170" cy="1522539"/>
+            <a:off x="22767320" y="9834921"/>
+            <a:ext cx="1354039" cy="1836765"/>
           </a:xfrm>
           <a:prstGeom prst="roundRect">
             <a:avLst/>
@@ -9945,7 +9872,7 @@
         <p:spPr>
           <a:xfrm>
             <a:off x="26034549" y="10821557"/>
-            <a:ext cx="1903034" cy="2084262"/>
+            <a:ext cx="2074052" cy="2271566"/>
           </a:xfrm>
           <a:prstGeom prst="rect">
             <a:avLst/>
@@ -9998,7 +9925,7 @@
         </p:nvSpPr>
         <p:spPr>
           <a:xfrm flipH="1">
-            <a:off x="24205652" y="10126702"/>
+            <a:off x="24191308" y="9981602"/>
             <a:ext cx="380303" cy="119609"/>
           </a:xfrm>
           <a:prstGeom prst="rightArrow">
@@ -10038,8 +9965,8 @@
         </p:nvSpPr>
         <p:spPr>
           <a:xfrm flipH="1">
-            <a:off x="24295473" y="10894690"/>
-            <a:ext cx="1124874" cy="136841"/>
+            <a:off x="24221439" y="11075160"/>
+            <a:ext cx="1198908" cy="131360"/>
           </a:xfrm>
           <a:prstGeom prst="rightArrow">
             <a:avLst/>
@@ -10141,8 +10068,8 @@
         </p:blipFill>
         <p:spPr>
           <a:xfrm>
-            <a:off x="23077517" y="9967448"/>
-            <a:ext cx="494797" cy="494797"/>
+            <a:off x="23158347" y="10215032"/>
+            <a:ext cx="414481" cy="414481"/>
           </a:xfrm>
           <a:prstGeom prst="rect">
             <a:avLst/>
@@ -10171,7 +10098,7 @@
         </p:blipFill>
         <p:spPr>
           <a:xfrm>
-            <a:off x="25519839" y="10873853"/>
+            <a:off x="25549403" y="10873853"/>
             <a:ext cx="507226" cy="337536"/>
           </a:xfrm>
           <a:prstGeom prst="rect">
@@ -10201,7 +10128,7 @@
         </p:blipFill>
         <p:spPr>
           <a:xfrm>
-            <a:off x="23615387" y="10000232"/>
+            <a:off x="23658512" y="10186506"/>
             <a:ext cx="467857" cy="429227"/>
           </a:xfrm>
           <a:prstGeom prst="rect">
@@ -10231,7 +10158,7 @@
         </p:blipFill>
         <p:spPr>
           <a:xfrm>
-            <a:off x="23664144" y="10712842"/>
+            <a:off x="23633140" y="11072356"/>
             <a:ext cx="419100" cy="457200"/>
           </a:xfrm>
           <a:prstGeom prst="rect">
@@ -10291,7 +10218,7 @@
         </p:blipFill>
         <p:spPr>
           <a:xfrm>
-            <a:off x="22693399" y="9517358"/>
+            <a:off x="22592399" y="9517358"/>
             <a:ext cx="900026" cy="346510"/>
           </a:xfrm>
           <a:prstGeom prst="rect">
@@ -10321,7 +10248,7 @@
         </p:blipFill>
         <p:spPr>
           <a:xfrm>
-            <a:off x="23004597" y="10822655"/>
+            <a:off x="22913521" y="11270793"/>
             <a:ext cx="599881" cy="234736"/>
           </a:xfrm>
           <a:prstGeom prst="rect">
@@ -10337,8 +10264,8 @@
         </p:nvSpPr>
         <p:spPr>
           <a:xfrm>
-            <a:off x="21832920" y="9969545"/>
-            <a:ext cx="1135092" cy="600164"/>
+            <a:off x="20992809" y="9952098"/>
+            <a:ext cx="1718335" cy="523220"/>
           </a:xfrm>
           <a:prstGeom prst="rect">
             <a:avLst/>
@@ -10352,26 +10279,26 @@
           <a:lstStyle/>
           <a:p>
             <a:r>
-              <a:rPr lang="de-DE" sz="1100" dirty="0" err="1" smtClean="0"/>
+              <a:rPr lang="de-DE" sz="1400" dirty="0" err="1" smtClean="0"/>
               <a:t>Stable</a:t>
             </a:r>
             <a:r>
-              <a:rPr lang="de-DE" sz="1100" dirty="0" smtClean="0"/>
+              <a:rPr lang="de-DE" sz="1400" dirty="0" smtClean="0"/>
               <a:t> experimental &amp; </a:t>
             </a:r>
             <a:r>
-              <a:rPr lang="de-DE" sz="1100" dirty="0" err="1" smtClean="0"/>
+              <a:rPr lang="de-DE" sz="1400" dirty="0" err="1" smtClean="0"/>
               <a:t>raw</a:t>
             </a:r>
             <a:r>
-              <a:rPr lang="de-DE" sz="1100" dirty="0" smtClean="0"/>
+              <a:rPr lang="de-DE" sz="1400" dirty="0" smtClean="0"/>
               <a:t> </a:t>
             </a:r>
             <a:r>
-              <a:rPr lang="de-DE" sz="1100" dirty="0" err="1" smtClean="0"/>
+              <a:rPr lang="de-DE" sz="1400" dirty="0" err="1" smtClean="0"/>
               <a:t>data</a:t>
             </a:r>
-            <a:endParaRPr lang="en-US" sz="1100" dirty="0"/>
+            <a:endParaRPr lang="en-US" sz="1400" dirty="0"/>
           </a:p>
         </p:txBody>
       </p:sp>
@@ -10383,8 +10310,8 @@
         </p:nvSpPr>
         <p:spPr>
           <a:xfrm>
-            <a:off x="21842227" y="10674065"/>
-            <a:ext cx="1211972" cy="600164"/>
+            <a:off x="20974558" y="10731769"/>
+            <a:ext cx="1857151" cy="523220"/>
           </a:xfrm>
           <a:prstGeom prst="rect">
             <a:avLst/>
@@ -10398,30 +10325,30 @@
           <a:lstStyle/>
           <a:p>
             <a:r>
-              <a:rPr lang="de-DE" sz="1100" dirty="0" smtClean="0"/>
+              <a:rPr lang="de-DE" sz="1400" dirty="0" smtClean="0"/>
               <a:t>Variant </a:t>
             </a:r>
             <a:r>
-              <a:rPr lang="de-DE" sz="1100" dirty="0" err="1" smtClean="0"/>
+              <a:rPr lang="de-DE" sz="1400" dirty="0" err="1" smtClean="0"/>
               <a:t>terminological</a:t>
             </a:r>
             <a:r>
-              <a:rPr lang="de-DE" sz="1100" dirty="0" smtClean="0"/>
+              <a:rPr lang="de-DE" sz="1400" dirty="0" smtClean="0"/>
               <a:t> &amp; </a:t>
             </a:r>
             <a:r>
-              <a:rPr lang="de-DE" sz="1100" dirty="0" err="1" smtClean="0"/>
+              <a:rPr lang="de-DE" sz="1400" dirty="0" err="1" smtClean="0"/>
               <a:t>contextual</a:t>
             </a:r>
             <a:r>
-              <a:rPr lang="de-DE" sz="1100" dirty="0" smtClean="0"/>
+              <a:rPr lang="de-DE" sz="1400" dirty="0" smtClean="0"/>
               <a:t>  </a:t>
             </a:r>
             <a:r>
-              <a:rPr lang="de-DE" sz="1100" dirty="0" err="1" smtClean="0"/>
+              <a:rPr lang="de-DE" sz="1400" dirty="0" err="1" smtClean="0"/>
               <a:t>data</a:t>
             </a:r>
-            <a:endParaRPr lang="en-US" sz="1100" dirty="0"/>
+            <a:endParaRPr lang="en-US" sz="1400" dirty="0"/>
           </a:p>
         </p:txBody>
       </p:sp>
@@ -10636,15 +10563,7 @@
           <a:p>
             <a:r>
               <a:rPr lang="en-US" sz="1600" dirty="0" smtClean="0"/>
-              <a:t>Enforces </a:t>
-            </a:r>
-            <a:r>
-              <a:rPr lang="en-US" sz="1600" dirty="0" smtClean="0"/>
-              <a:t>completeness  </a:t>
-            </a:r>
-            <a:r>
-              <a:rPr lang="en-US" sz="1600" dirty="0" smtClean="0"/>
-              <a:t>i.e. along Minimum </a:t>
+              <a:t>Enforces completeness  i.e. along Minimum </a:t>
             </a:r>
             <a:r>
               <a:rPr lang="en-US" sz="1600" dirty="0"/>
@@ -11471,7 +11390,7 @@
         <p:spPr>
           <a:xfrm>
             <a:off x="26839542" y="21766104"/>
-            <a:ext cx="2285787" cy="3533115"/>
+            <a:ext cx="2523966" cy="3533115"/>
           </a:xfrm>
           <a:prstGeom prst="rect">
             <a:avLst/>
@@ -11519,7 +11438,7 @@
         <p:spPr>
           <a:xfrm>
             <a:off x="20109313" y="25299219"/>
-            <a:ext cx="9035373" cy="841316"/>
+            <a:ext cx="9254195" cy="841316"/>
           </a:xfrm>
           <a:prstGeom prst="rect">
             <a:avLst/>
@@ -11567,8 +11486,8 @@
         </p:nvSpPr>
         <p:spPr>
           <a:xfrm>
-            <a:off x="20090070" y="21766105"/>
-            <a:ext cx="6740927" cy="3523564"/>
+            <a:off x="20109312" y="21766105"/>
+            <a:ext cx="6721685" cy="3523564"/>
           </a:xfrm>
           <a:prstGeom prst="rect">
             <a:avLst/>
@@ -12033,18 +11952,7 @@
                   </a:schemeClr>
                 </a:solidFill>
               </a:rPr>
-              <a:t> </a:t>
-            </a:r>
-            <a:r>
-              <a:rPr lang="de-DE" sz="1800" dirty="0" err="1" smtClean="0">
-                <a:solidFill>
-                  <a:schemeClr val="tx1">
-                    <a:lumMod val="75000"/>
-                    <a:lumOff val="25000"/>
-                  </a:schemeClr>
-                </a:solidFill>
-              </a:rPr>
-              <a:t>Varian</a:t>
+              <a:t> Agilent</a:t>
             </a:r>
             <a:endParaRPr lang="en-US" sz="1800" dirty="0"/>
           </a:p>
@@ -12060,7 +11968,7 @@
         </p:nvSpPr>
         <p:spPr>
           <a:xfrm>
-            <a:off x="25015721" y="24778898"/>
+            <a:off x="25015724" y="24781158"/>
             <a:ext cx="1832276" cy="533552"/>
           </a:xfrm>
           <a:prstGeom prst="rect">
@@ -12298,7 +12206,7 @@
         </p:nvSpPr>
         <p:spPr>
           <a:xfrm>
-            <a:off x="25146433" y="23039322"/>
+            <a:off x="25015724" y="22980859"/>
             <a:ext cx="1680840" cy="770256"/>
           </a:xfrm>
           <a:prstGeom prst="rect">
@@ -12772,7 +12680,7 @@
         </p:nvSpPr>
         <p:spPr>
           <a:xfrm>
-            <a:off x="23207235" y="23016309"/>
+            <a:off x="23221741" y="22971581"/>
             <a:ext cx="1597458" cy="632839"/>
           </a:xfrm>
           <a:prstGeom prst="rect">
@@ -13207,7 +13115,7 @@
               <a:t>. </a:t>
             </a:r>
             <a:r>
-              <a:rPr lang="fr-FR" sz="1350" dirty="0" err="1" smtClean="0">
+              <a:rPr lang="fr-FR" sz="1350" i="1" dirty="0" err="1" smtClean="0">
                 <a:solidFill>
                   <a:schemeClr val="dk1"/>
                 </a:solidFill>
@@ -13218,7 +13126,7 @@
               <a:t>nmr</a:t>
             </a:r>
             <a:r>
-              <a:rPr lang="fr-FR" sz="1350" dirty="0" smtClean="0">
+              <a:rPr lang="fr-FR" sz="1350" i="1" dirty="0" smtClean="0">
                 <a:solidFill>
                   <a:schemeClr val="dk1"/>
                 </a:solidFill>
@@ -13229,7 +13137,7 @@
               <a:t> </a:t>
             </a:r>
             <a:r>
-              <a:rPr lang="fr-FR" sz="1350" dirty="0" err="1">
+              <a:rPr lang="fr-FR" sz="1350" i="1" dirty="0" err="1">
                 <a:solidFill>
                   <a:schemeClr val="dk1"/>
                 </a:solidFill>
@@ -13240,7 +13148,7 @@
               <a:t>spectra</a:t>
             </a:r>
             <a:r>
-              <a:rPr lang="fr-FR" sz="1350" dirty="0">
+              <a:rPr lang="fr-FR" sz="1350" i="1" dirty="0">
                 <a:solidFill>
                   <a:schemeClr val="dk1"/>
                 </a:solidFill>
@@ -13251,7 +13159,7 @@
               <a:t> </a:t>
             </a:r>
             <a:r>
-              <a:rPr lang="fr-FR" sz="1350" dirty="0" err="1" smtClean="0">
+              <a:rPr lang="fr-FR" sz="1350" i="1" dirty="0" err="1" smtClean="0">
                 <a:solidFill>
                   <a:schemeClr val="dk1"/>
                 </a:solidFill>
@@ -13261,7 +13169,7 @@
               </a:rPr>
               <a:t>viewer</a:t>
             </a:r>
-            <a:endParaRPr lang="fr-FR" sz="1350" dirty="0">
+            <a:endParaRPr lang="fr-FR" sz="1350" i="1" dirty="0">
               <a:solidFill>
                 <a:schemeClr val="dk1"/>
               </a:solidFill>
@@ -13324,7 +13232,7 @@
         <p:spPr>
           <a:xfrm>
             <a:off x="26839542" y="25377596"/>
-            <a:ext cx="2266343" cy="650984"/>
+            <a:ext cx="2497863" cy="650984"/>
           </a:xfrm>
           <a:prstGeom prst="rect">
             <a:avLst/>
@@ -13371,8 +13279,8 @@
         </p:nvSpPr>
         <p:spPr>
           <a:xfrm>
-            <a:off x="26855869" y="25437796"/>
-            <a:ext cx="2193970" cy="600617"/>
+            <a:off x="26871484" y="25400518"/>
+            <a:ext cx="2465921" cy="651714"/>
           </a:xfrm>
           <a:prstGeom prst="rect">
             <a:avLst/>
@@ -13380,7 +13288,7 @@
         </p:spPr>
         <p:txBody>
           <a:bodyPr vert="horz" lIns="68580" tIns="34290" rIns="68580" bIns="34290" rtlCol="0">
-            <a:normAutofit fontScale="85000" lnSpcReduction="10000"/>
+            <a:normAutofit/>
           </a:bodyPr>
           <a:lstStyle>
             <a:lvl1pPr marL="228600" indent="-228600" algn="l" defTabSz="914400" rtl="0" eaLnBrk="1" latinLnBrk="0" hangingPunct="1">
@@ -13551,7 +13459,7 @@
               <a:buNone/>
             </a:pPr>
             <a:r>
-              <a:rPr lang="de-DE" sz="1800" b="1" i="1" dirty="0" err="1" smtClean="0">
+              <a:rPr lang="de-DE" sz="1500" b="1" i="1" dirty="0" err="1" smtClean="0">
                 <a:solidFill>
                   <a:schemeClr val="tx1">
                     <a:lumMod val="75000"/>
@@ -13562,7 +13470,7 @@
               <a:t>Metabolomics</a:t>
             </a:r>
             <a:r>
-              <a:rPr lang="de-DE" sz="1800" b="1" i="1" dirty="0" smtClean="0">
+              <a:rPr lang="de-DE" sz="1500" b="1" i="1" dirty="0" smtClean="0">
                 <a:solidFill>
                   <a:schemeClr val="tx1">
                     <a:lumMod val="75000"/>
@@ -13579,21 +13487,17 @@
             </a:pPr>
             <a:r>
               <a:rPr lang="de-DE" sz="1500" dirty="0" smtClean="0"/>
-              <a:t>  e.g</a:t>
-            </a:r>
-            <a:r>
-              <a:rPr lang="de-DE" sz="1500" dirty="0" smtClean="0"/>
-              <a:t>. </a:t>
-            </a:r>
-            <a:r>
-              <a:rPr lang="de-DE" sz="1500" dirty="0" err="1" smtClean="0"/>
+              <a:t>  e.g. </a:t>
+            </a:r>
+            <a:r>
+              <a:rPr lang="de-DE" sz="1500" i="1" dirty="0" err="1" smtClean="0"/>
               <a:t>Metabolights</a:t>
             </a:r>
             <a:r>
-              <a:rPr lang="de-DE" sz="1500" dirty="0" smtClean="0"/>
+              <a:rPr lang="de-DE" sz="1500" i="1" dirty="0" smtClean="0"/>
               <a:t>, HMDB,  …</a:t>
             </a:r>
-            <a:endParaRPr lang="en-US" sz="1500" dirty="0"/>
+            <a:endParaRPr lang="en-US" sz="1500" i="1" dirty="0"/>
           </a:p>
         </p:txBody>
       </p:sp>
@@ -14332,7 +14236,7 @@
         </p:nvSpPr>
         <p:spPr>
           <a:xfrm>
-            <a:off x="20141305" y="21799307"/>
+            <a:off x="20109312" y="21815648"/>
             <a:ext cx="898003" cy="307777"/>
           </a:xfrm>
           <a:prstGeom prst="rect">
@@ -14370,7 +14274,7 @@
         </p:nvSpPr>
         <p:spPr>
           <a:xfrm>
-            <a:off x="20122332" y="25303719"/>
+            <a:off x="20092310" y="25303719"/>
             <a:ext cx="1342034" cy="307777"/>
           </a:xfrm>
           <a:prstGeom prst="rect">
@@ -14502,6 +14406,96 @@
           <a:xfrm>
             <a:off x="24568288" y="24095284"/>
             <a:ext cx="762293" cy="293483"/>
+          </a:xfrm>
+          <a:prstGeom prst="rect">
+            <a:avLst/>
+          </a:prstGeom>
+        </p:spPr>
+      </p:pic>
+      <p:sp>
+        <p:nvSpPr>
+          <p:cNvPr id="193" name="Textfeld 192"/>
+          <p:cNvSpPr txBox="1"/>
+          <p:nvPr/>
+        </p:nvSpPr>
+        <p:spPr>
+          <a:xfrm>
+            <a:off x="22791753" y="9924578"/>
+            <a:ext cx="1260487" cy="300082"/>
+          </a:xfrm>
+          <a:prstGeom prst="rect">
+            <a:avLst/>
+          </a:prstGeom>
+          <a:noFill/>
+        </p:spPr>
+        <p:txBody>
+          <a:bodyPr wrap="square" rtlCol="0">
+            <a:spAutoFit/>
+          </a:bodyPr>
+          <a:lstStyle/>
+          <a:p>
+            <a:r>
+              <a:rPr lang="de-DE" sz="1350" b="1" dirty="0" smtClean="0"/>
+              <a:t>nmrML.xsd</a:t>
+            </a:r>
+            <a:endParaRPr lang="en-US" sz="1350" b="1" dirty="0"/>
+          </a:p>
+        </p:txBody>
+      </p:sp>
+      <p:sp>
+        <p:nvSpPr>
+          <p:cNvPr id="194" name="Textfeld 193"/>
+          <p:cNvSpPr txBox="1"/>
+          <p:nvPr/>
+        </p:nvSpPr>
+        <p:spPr>
+          <a:xfrm>
+            <a:off x="22778479" y="10759305"/>
+            <a:ext cx="1260487" cy="300082"/>
+          </a:xfrm>
+          <a:prstGeom prst="rect">
+            <a:avLst/>
+          </a:prstGeom>
+          <a:noFill/>
+        </p:spPr>
+        <p:txBody>
+          <a:bodyPr wrap="square" rtlCol="0">
+            <a:spAutoFit/>
+          </a:bodyPr>
+          <a:lstStyle/>
+          <a:p>
+            <a:r>
+              <a:rPr lang="de-DE" sz="1350" b="1" dirty="0" err="1" smtClean="0"/>
+              <a:t>nmrCV.owl</a:t>
+            </a:r>
+            <a:endParaRPr lang="en-US" sz="1350" b="1" dirty="0"/>
+          </a:p>
+        </p:txBody>
+      </p:sp>
+      <p:pic>
+        <p:nvPicPr>
+          <p:cNvPr id="10" name="Grafik 9"/>
+          <p:cNvPicPr>
+            <a:picLocks noChangeAspect="1"/>
+          </p:cNvPicPr>
+          <p:nvPr/>
+        </p:nvPicPr>
+        <p:blipFill>
+          <a:blip r:embed="rId64">
+            <a:extLst>
+              <a:ext uri="{28A0092B-C50C-407E-A947-70E740481C1C}">
+                <a14:useLocalDpi xmlns:a14="http://schemas.microsoft.com/office/drawing/2010/main" val="0"/>
+              </a:ext>
+            </a:extLst>
+          </a:blip>
+          <a:stretch>
+            <a:fillRect/>
+          </a:stretch>
+        </p:blipFill>
+        <p:spPr>
+          <a:xfrm>
+            <a:off x="28168312" y="41172984"/>
+            <a:ext cx="1301584" cy="615034"/>
           </a:xfrm>
           <a:prstGeom prst="rect">
             <a:avLst/>

</xml_diff>